<commit_message>
Re-knit Workshop 1 ppt using R 4.1.0
</commit_message>
<xml_diff>
--- a/Workshops/Workshop1.pptx
+++ b/Workshops/Workshop1.pptx
@@ -4170,7 +4170,7 @@
               <a:t> </a:t>
             </a:r>
             <a:r>
-              <a:rPr sz="1800">
+              <a:rPr>
                 <a:latin typeface="Courier"/>
               </a:rPr>
               <a:t>CCYY-MM-DD.R</a:t>
@@ -8773,7 +8773,7 @@
               <a:t>This is your prompt to type </a:t>
             </a:r>
             <a:r>
-              <a:rPr sz="1800">
+              <a:rPr>
                 <a:latin typeface="Courier"/>
               </a:rPr>
               <a:t>&gt;</a:t>
@@ -8790,7 +8790,7 @@
               <a:t>Type </a:t>
             </a:r>
             <a:r>
-              <a:rPr sz="1800">
+              <a:rPr>
                 <a:latin typeface="Courier"/>
               </a:rPr>
               <a:t>2 + 2</a:t>
@@ -8800,7 +8800,7 @@
               <a:t> then hit </a:t>
             </a:r>
             <a:r>
-              <a:rPr sz="1800">
+              <a:rPr>
                 <a:latin typeface="Courier"/>
               </a:rPr>
               <a:t>Enter</a:t>
@@ -8903,11 +8903,11 @@
             </a:r>
           </a:p>
           <a:p>
-            <a:pPr lvl="0" marL="1270000" indent="0">
+            <a:pPr lvl="0" indent="0">
               <a:buNone/>
             </a:pPr>
             <a:r>
-              <a:rPr sz="1800">
+              <a:rPr>
                 <a:solidFill>
                   <a:srgbClr val="40A070"/>
                 </a:solidFill>
@@ -8916,31 +8916,28 @@
               <a:t>2</a:t>
             </a:r>
             <a:r>
-              <a:rPr sz="1800">
-                <a:latin typeface="Courier"/>
-              </a:rPr>
-              <a:t> </a:t>
-            </a:r>
-            <a:r>
-              <a:rPr sz="1800">
-                <a:solidFill>
-                  <a:srgbClr val="666666"/>
-                </a:solidFill>
-                <a:latin typeface="Courier"/>
-              </a:rPr>
-              <a:t>+</a:t>
-            </a:r>
-            <a:r>
-              <a:rPr sz="1800">
+              <a:rPr>
+                <a:latin typeface="Courier"/>
+              </a:rPr>
+              <a:t> </a:t>
+            </a:r>
+            <a:r>
+              <a:rPr>
                 <a:solidFill>
                   <a:srgbClr val="4070A0"/>
                 </a:solidFill>
                 <a:latin typeface="Courier"/>
               </a:rPr>
-              <a:t> </a:t>
-            </a:r>
-            <a:r>
-              <a:rPr sz="1800">
+              <a:t>+</a:t>
+            </a:r>
+            <a:r>
+              <a:rPr>
+                <a:latin typeface="Courier"/>
+              </a:rPr>
+              <a:t> </a:t>
+            </a:r>
+            <a:r>
+              <a:rPr>
                 <a:solidFill>
                   <a:srgbClr val="40A070"/>
                 </a:solidFill>
@@ -8950,11 +8947,11 @@
             </a:r>
           </a:p>
           <a:p>
-            <a:pPr lvl="0" marL="1270000" indent="0">
+            <a:pPr lvl="0" indent="0">
               <a:buNone/>
             </a:pPr>
             <a:r>
-              <a:rPr sz="1800">
+              <a:rPr>
                 <a:latin typeface="Courier"/>
               </a:rPr>
               <a:t>## [1] 4</a:t>
@@ -8963,7 +8960,7 @@
           <a:p>
             <a:pPr lvl="1"/>
             <a:r>
-              <a:rPr sz="1800">
+              <a:rPr>
                 <a:latin typeface="Courier"/>
               </a:rPr>
               <a:t>&gt;</a:t>
@@ -8976,7 +8973,7 @@
           <a:p>
             <a:pPr lvl="1"/>
             <a:r>
-              <a:rPr sz="1800">
+              <a:rPr>
                 <a:latin typeface="Courier"/>
               </a:rPr>
               <a:t>2 + 2</a:t>
@@ -8989,7 +8986,7 @@
           <a:p>
             <a:pPr lvl="1"/>
             <a:r>
-              <a:rPr sz="1800">
+              <a:rPr>
                 <a:latin typeface="Courier"/>
               </a:rPr>
               <a:t>4</a:t>
@@ -9002,7 +8999,7 @@
           <a:p>
             <a:pPr lvl="1"/>
             <a:r>
-              <a:rPr sz="1800">
+              <a:rPr>
                 <a:latin typeface="Courier"/>
               </a:rPr>
               <a:t>[1]</a:t>
@@ -9209,7 +9206,7 @@
               <a:t>Type </a:t>
             </a:r>
             <a:r>
-              <a:rPr sz="1800">
+              <a:rPr>
                 <a:latin typeface="Courier"/>
               </a:rPr>
               <a:t>2 + 2</a:t>
@@ -9219,7 +9216,7 @@
               <a:t>, then </a:t>
             </a:r>
             <a:r>
-              <a:rPr sz="1800">
+              <a:rPr>
                 <a:latin typeface="Courier"/>
               </a:rPr>
               <a:t>Enter</a:t>
@@ -9257,7 +9254,7 @@
               <a:t>MacOS: </a:t>
             </a:r>
             <a:r>
-              <a:rPr sz="1800">
+              <a:rPr>
                 <a:latin typeface="Courier"/>
               </a:rPr>
               <a:t>Cmd + Enter</a:t>
@@ -9270,7 +9267,7 @@
               <a:t>Windows: </a:t>
             </a:r>
             <a:r>
-              <a:rPr sz="1800">
+              <a:rPr>
                 <a:latin typeface="Courier"/>
               </a:rPr>
               <a:t>Ctrl + Enter</a:t>
@@ -9381,7 +9378,7 @@
               <a:t>Click the </a:t>
             </a:r>
             <a:r>
-              <a:rPr sz="1800">
+              <a:rPr>
                 <a:latin typeface="Courier"/>
               </a:rPr>
               <a:t>save</a:t>
@@ -9433,7 +9430,7 @@
               <a:t>Restart R Studio and click the </a:t>
             </a:r>
             <a:r>
-              <a:rPr sz="1800">
+              <a:rPr>
                 <a:latin typeface="Courier"/>
               </a:rPr>
               <a:t>open</a:t>
@@ -9801,7 +9798,7 @@
               <a:t>Real numbers - </a:t>
             </a:r>
             <a:r>
-              <a:rPr sz="1800">
+              <a:rPr>
                 <a:latin typeface="Courier"/>
               </a:rPr>
               <a:t>numeric</a:t>
@@ -9814,7 +9811,7 @@
               <a:t>Discrete numbers - </a:t>
             </a:r>
             <a:r>
-              <a:rPr sz="1800">
+              <a:rPr>
                 <a:latin typeface="Courier"/>
               </a:rPr>
               <a:t>integer</a:t>
@@ -9827,7 +9824,7 @@
               <a:t>Characters - </a:t>
             </a:r>
             <a:r>
-              <a:rPr sz="1800">
+              <a:rPr>
                 <a:latin typeface="Courier"/>
               </a:rPr>
               <a:t>character</a:t>
@@ -9974,7 +9971,7 @@
               <a:t>This is the assignment operator </a:t>
             </a:r>
             <a:r>
-              <a:rPr sz="1800">
+              <a:rPr>
                 <a:latin typeface="Courier"/>
               </a:rPr>
               <a:t>&lt;-</a:t>
@@ -9984,7 +9981,7 @@
               <a:t>(</a:t>
             </a:r>
             <a:r>
-              <a:rPr sz="1800">
+              <a:rPr>
                 <a:latin typeface="Courier"/>
               </a:rPr>
               <a:t>=</a:t>
@@ -10008,7 +10005,7 @@
               <a:t>Mac OSX: </a:t>
             </a:r>
             <a:r>
-              <a:rPr sz="1800">
+              <a:rPr>
                 <a:latin typeface="Courier"/>
               </a:rPr>
               <a:t>Option + -</a:t>
@@ -10021,7 +10018,7 @@
               <a:t>Windows: </a:t>
             </a:r>
             <a:r>
-              <a:rPr sz="1800">
+              <a:rPr>
                 <a:latin typeface="Courier"/>
               </a:rPr>
               <a:t>Alt + -</a:t>
@@ -10035,26 +10032,62 @@
             </a:r>
           </a:p>
           <a:p>
-            <a:pPr lvl="0" marL="1270000" indent="0">
+            <a:pPr lvl="0" indent="0">
               <a:buNone/>
             </a:pPr>
             <a:r>
-              <a:rPr sz="1800">
-                <a:latin typeface="Courier"/>
-              </a:rPr>
-              <a:t>practice &lt;-</a:t>
-            </a:r>
-            <a:r>
-              <a:rPr sz="1800">
+              <a:rPr>
+                <a:latin typeface="Courier"/>
+              </a:rPr>
+              <a:t>practice </a:t>
+            </a:r>
+            <a:r>
+              <a:rPr>
+                <a:solidFill>
+                  <a:srgbClr val="007020"/>
+                </a:solidFill>
+                <a:latin typeface="Courier"/>
+              </a:rPr>
+              <a:t>&lt;-</a:t>
+            </a:r>
+            <a:r>
+              <a:rPr>
+                <a:latin typeface="Courier"/>
+              </a:rPr>
+              <a:t> </a:t>
+            </a:r>
+            <a:r>
+              <a:rPr>
+                <a:solidFill>
+                  <a:srgbClr val="40A070"/>
+                </a:solidFill>
+                <a:latin typeface="Courier"/>
+              </a:rPr>
+              <a:t>2</a:t>
+            </a:r>
+            <a:r>
+              <a:rPr>
+                <a:latin typeface="Courier"/>
+              </a:rPr>
+              <a:t> </a:t>
+            </a:r>
+            <a:r>
+              <a:rPr>
                 <a:solidFill>
                   <a:srgbClr val="4070A0"/>
                 </a:solidFill>
                 <a:latin typeface="Courier"/>
               </a:rPr>
-              <a:t> </a:t>
-            </a:r>
-            <a:r>
-              <a:rPr sz="1800">
+              <a:t>+</a:t>
+            </a:r>
+            <a:r>
+              <a:rPr>
+                <a:latin typeface="Courier"/>
+              </a:rPr>
+              <a:t> </a:t>
+            </a:r>
+            <a:r>
+              <a:rPr>
                 <a:solidFill>
                   <a:srgbClr val="40A070"/>
                 </a:solidFill>
@@ -10063,85 +10096,49 @@
               <a:t>2</a:t>
             </a:r>
             <a:r>
-              <a:rPr sz="1800">
-                <a:latin typeface="Courier"/>
-              </a:rPr>
-              <a:t> </a:t>
-            </a:r>
-            <a:r>
-              <a:rPr sz="1800">
-                <a:solidFill>
-                  <a:srgbClr val="666666"/>
-                </a:solidFill>
-                <a:latin typeface="Courier"/>
-              </a:rPr>
-              <a:t>+</a:t>
-            </a:r>
-            <a:r>
-              <a:rPr sz="1800">
+              <a:rPr>
+                <a:latin typeface="Courier"/>
+              </a:rPr>
+              <a:t> </a:t>
+            </a:r>
+            <a:r>
+              <a:rPr>
                 <a:solidFill>
                   <a:srgbClr val="4070A0"/>
                 </a:solidFill>
                 <a:latin typeface="Courier"/>
               </a:rPr>
-              <a:t> </a:t>
-            </a:r>
-            <a:r>
-              <a:rPr sz="1800">
+              <a:t>+</a:t>
+            </a:r>
+            <a:r>
+              <a:rPr>
+                <a:latin typeface="Courier"/>
+              </a:rPr>
+              <a:t> </a:t>
+            </a:r>
+            <a:r>
+              <a:rPr>
                 <a:solidFill>
                   <a:srgbClr val="40A070"/>
                 </a:solidFill>
                 <a:latin typeface="Courier"/>
               </a:rPr>
-              <a:t>2</a:t>
-            </a:r>
-            <a:r>
-              <a:rPr sz="1800">
-                <a:latin typeface="Courier"/>
-              </a:rPr>
-              <a:t> </a:t>
-            </a:r>
-            <a:r>
-              <a:rPr sz="1800">
-                <a:solidFill>
-                  <a:srgbClr val="666666"/>
-                </a:solidFill>
-                <a:latin typeface="Courier"/>
-              </a:rPr>
-              <a:t>+</a:t>
-            </a:r>
-            <a:r>
-              <a:rPr sz="1800">
-                <a:solidFill>
-                  <a:srgbClr val="4070A0"/>
-                </a:solidFill>
-                <a:latin typeface="Courier"/>
-              </a:rPr>
-              <a:t> </a:t>
-            </a:r>
-            <a:r>
-              <a:rPr sz="1800">
-                <a:solidFill>
-                  <a:srgbClr val="40A070"/>
-                </a:solidFill>
-                <a:latin typeface="Courier"/>
-              </a:rPr>
               <a:t>6</a:t>
             </a:r>
             <a:br/>
             <a:r>
-              <a:rPr sz="1800">
+              <a:rPr>
                 <a:latin typeface="Courier"/>
               </a:rPr>
               <a:t>practice</a:t>
             </a:r>
           </a:p>
           <a:p>
-            <a:pPr lvl="0" marL="1270000" indent="0">
+            <a:pPr lvl="0" indent="0">
               <a:buNone/>
             </a:pPr>
             <a:r>
-              <a:rPr sz="1800">
+              <a:rPr>
                 <a:latin typeface="Courier"/>
               </a:rPr>
               <a:t>## [1] 10</a:t>
@@ -10245,38 +10242,53 @@
             </a:r>
           </a:p>
           <a:p>
-            <a:pPr lvl="0" marL="1270000" indent="0">
+            <a:pPr lvl="0" indent="0">
               <a:buNone/>
             </a:pPr>
             <a:r>
-              <a:rPr sz="1800">
-                <a:latin typeface="Courier"/>
-              </a:rPr>
-              <a:t>say_hello &lt;-</a:t>
-            </a:r>
-            <a:r>
-              <a:rPr sz="1800">
+              <a:rPr>
+                <a:latin typeface="Courier"/>
+              </a:rPr>
+              <a:t>say_hello </a:t>
+            </a:r>
+            <a:r>
+              <a:rPr>
+                <a:solidFill>
+                  <a:srgbClr val="007020"/>
+                </a:solidFill>
+                <a:latin typeface="Courier"/>
+              </a:rPr>
+              <a:t>&lt;-</a:t>
+            </a:r>
+            <a:r>
+              <a:rPr>
+                <a:latin typeface="Courier"/>
+              </a:rPr>
+              <a:t> </a:t>
+            </a:r>
+            <a:r>
+              <a:rPr>
                 <a:solidFill>
                   <a:srgbClr val="4070A0"/>
                 </a:solidFill>
                 <a:latin typeface="Courier"/>
               </a:rPr>
-              <a:t> "hello"</a:t>
+              <a:t>"hello"</a:t>
             </a:r>
             <a:br/>
             <a:r>
-              <a:rPr sz="1800">
+              <a:rPr>
                 <a:latin typeface="Courier"/>
               </a:rPr>
               <a:t>say_hello</a:t>
             </a:r>
           </a:p>
           <a:p>
-            <a:pPr lvl="0" marL="1270000" indent="0">
+            <a:pPr lvl="0" indent="0">
               <a:buNone/>
             </a:pPr>
             <a:r>
-              <a:rPr sz="1800">
+              <a:rPr>
                 <a:latin typeface="Courier"/>
               </a:rPr>
               <a:t>## [1] "hello"</a:t>
@@ -10290,31 +10302,46 @@
             </a:r>
           </a:p>
           <a:p>
-            <a:pPr lvl="0" marL="1270000" indent="0">
+            <a:pPr lvl="0" indent="0">
               <a:buNone/>
             </a:pPr>
             <a:r>
-              <a:rPr sz="1800">
-                <a:latin typeface="Courier"/>
-              </a:rPr>
-              <a:t>say hello &lt;-</a:t>
-            </a:r>
-            <a:r>
-              <a:rPr sz="1800">
+              <a:rPr>
+                <a:latin typeface="Courier"/>
+              </a:rPr>
+              <a:t>say hello </a:t>
+            </a:r>
+            <a:r>
+              <a:rPr>
+                <a:solidFill>
+                  <a:srgbClr val="007020"/>
+                </a:solidFill>
+                <a:latin typeface="Courier"/>
+              </a:rPr>
+              <a:t>&lt;-</a:t>
+            </a:r>
+            <a:r>
+              <a:rPr>
+                <a:latin typeface="Courier"/>
+              </a:rPr>
+              <a:t> </a:t>
+            </a:r>
+            <a:r>
+              <a:rPr>
                 <a:solidFill>
                   <a:srgbClr val="4070A0"/>
                 </a:solidFill>
                 <a:latin typeface="Courier"/>
               </a:rPr>
-              <a:t> "hello"</a:t>
-            </a:r>
-          </a:p>
-          <a:p>
-            <a:pPr lvl="0" marL="1270000" indent="0">
+              <a:t>"hello"</a:t>
+            </a:r>
+          </a:p>
+          <a:p>
+            <a:pPr lvl="0" indent="0">
               <a:buNone/>
             </a:pPr>
             <a:r>
-              <a:rPr sz="1800">
+              <a:rPr>
                 <a:latin typeface="Courier"/>
               </a:rPr>
               <a:t>## Error: &lt;text&gt;:1:5: unexpected symbol
@@ -10522,11 +10549,11 @@
             </a:r>
           </a:p>
           <a:p>
-            <a:pPr lvl="0" marL="1270000" indent="0">
+            <a:pPr lvl="1" indent="0">
               <a:buNone/>
             </a:pPr>
             <a:r>
-              <a:rPr sz="1800">
+              <a:rPr>
                 <a:latin typeface="Courier"/>
               </a:rPr>
               <a:t>## [1] 50 25 32 67 46 19 48</a:t>
@@ -10540,11 +10567,11 @@
             </a:r>
           </a:p>
           <a:p>
-            <a:pPr lvl="0" marL="1270000" indent="0">
+            <a:pPr lvl="1" indent="0">
               <a:buNone/>
             </a:pPr>
             <a:r>
-              <a:rPr sz="1800">
+              <a:rPr>
                 <a:latin typeface="Courier"/>
               </a:rPr>
               <a:t>## [1] 37.5 37.1 37.3 38.3 37.4 38.9</a:t>
@@ -10558,11 +10585,11 @@
             </a:r>
           </a:p>
           <a:p>
-            <a:pPr lvl="0" marL="1270000" indent="0">
+            <a:pPr lvl="1" indent="0">
               <a:buNone/>
             </a:pPr>
             <a:r>
-              <a:rPr sz="1800">
+              <a:rPr>
                 <a:latin typeface="Courier"/>
               </a:rPr>
               <a:t>## [1] "Adam"  "Sally" "Eve"   "John"  "James"</a:t>
@@ -10576,11 +10603,11 @@
             </a:r>
           </a:p>
           <a:p>
-            <a:pPr lvl="0" marL="1270000" indent="0">
+            <a:pPr lvl="1" indent="0">
               <a:buNone/>
             </a:pPr>
             <a:r>
-              <a:rPr sz="1800">
+              <a:rPr>
                 <a:latin typeface="Courier"/>
               </a:rPr>
               <a:t>## [1]  TRUE FALSE FALSE  TRUE  TRUE</a:t>
@@ -10593,7 +10620,7 @@
               <a:t>You can always check the data type in a vector using the function </a:t>
             </a:r>
             <a:r>
-              <a:rPr sz="1800">
+              <a:rPr>
                 <a:latin typeface="Courier"/>
               </a:rPr>
               <a:t>class()</a:t>
@@ -10604,137 +10631,143 @@
             </a:r>
           </a:p>
           <a:p>
-            <a:pPr lvl="0" marL="1270000" indent="0">
+            <a:pPr lvl="0" indent="0">
               <a:buNone/>
             </a:pPr>
             <a:r>
-              <a:rPr sz="1800">
-                <a:latin typeface="Courier"/>
-              </a:rPr>
-              <a:t>logical_vector &lt;-</a:t>
-            </a:r>
-            <a:r>
-              <a:rPr sz="1800">
-                <a:solidFill>
-                  <a:srgbClr val="4070A0"/>
-                </a:solidFill>
-                <a:latin typeface="Courier"/>
-              </a:rPr>
-              <a:t> </a:t>
-            </a:r>
-            <a:r>
-              <a:rPr sz="1800" b="1">
+              <a:rPr>
+                <a:latin typeface="Courier"/>
+              </a:rPr>
+              <a:t>logical_vector </a:t>
+            </a:r>
+            <a:r>
+              <a:rPr>
                 <a:solidFill>
                   <a:srgbClr val="007020"/>
                 </a:solidFill>
                 <a:latin typeface="Courier"/>
               </a:rPr>
+              <a:t>&lt;-</a:t>
+            </a:r>
+            <a:r>
+              <a:rPr>
+                <a:latin typeface="Courier"/>
+              </a:rPr>
+              <a:t> </a:t>
+            </a:r>
+            <a:r>
+              <a:rPr>
+                <a:solidFill>
+                  <a:srgbClr val="06287E"/>
+                </a:solidFill>
+                <a:latin typeface="Courier"/>
+              </a:rPr>
               <a:t>c</a:t>
             </a:r>
             <a:r>
-              <a:rPr sz="1800">
+              <a:rPr>
                 <a:latin typeface="Courier"/>
               </a:rPr>
               <a:t>(</a:t>
             </a:r>
             <a:r>
-              <a:rPr sz="1800">
+              <a:rPr>
                 <a:solidFill>
-                  <a:srgbClr val="007020"/>
+                  <a:srgbClr val="880000"/>
                 </a:solidFill>
                 <a:latin typeface="Courier"/>
               </a:rPr>
               <a:t>TRUE</a:t>
             </a:r>
             <a:r>
-              <a:rPr sz="1800">
+              <a:rPr>
                 <a:latin typeface="Courier"/>
               </a:rPr>
               <a:t>, </a:t>
             </a:r>
             <a:r>
-              <a:rPr sz="1800">
+              <a:rPr>
                 <a:solidFill>
-                  <a:srgbClr val="007020"/>
+                  <a:srgbClr val="880000"/>
                 </a:solidFill>
                 <a:latin typeface="Courier"/>
               </a:rPr>
               <a:t>FALSE</a:t>
             </a:r>
             <a:r>
-              <a:rPr sz="1800">
+              <a:rPr>
                 <a:latin typeface="Courier"/>
               </a:rPr>
               <a:t>, </a:t>
             </a:r>
             <a:r>
-              <a:rPr sz="1800">
+              <a:rPr>
                 <a:solidFill>
-                  <a:srgbClr val="007020"/>
+                  <a:srgbClr val="880000"/>
                 </a:solidFill>
                 <a:latin typeface="Courier"/>
               </a:rPr>
               <a:t>FALSE</a:t>
             </a:r>
             <a:r>
-              <a:rPr sz="1800">
+              <a:rPr>
                 <a:latin typeface="Courier"/>
               </a:rPr>
               <a:t>, </a:t>
             </a:r>
             <a:r>
-              <a:rPr sz="1800">
+              <a:rPr>
                 <a:solidFill>
-                  <a:srgbClr val="007020"/>
+                  <a:srgbClr val="880000"/>
                 </a:solidFill>
                 <a:latin typeface="Courier"/>
               </a:rPr>
               <a:t>TRUE</a:t>
             </a:r>
             <a:r>
-              <a:rPr sz="1800">
+              <a:rPr>
                 <a:latin typeface="Courier"/>
               </a:rPr>
               <a:t>, </a:t>
             </a:r>
             <a:r>
-              <a:rPr sz="1800">
+              <a:rPr>
                 <a:solidFill>
-                  <a:srgbClr val="007020"/>
+                  <a:srgbClr val="880000"/>
                 </a:solidFill>
                 <a:latin typeface="Courier"/>
               </a:rPr>
               <a:t>TRUE</a:t>
             </a:r>
             <a:r>
-              <a:rPr sz="1800">
+              <a:rPr>
                 <a:latin typeface="Courier"/>
               </a:rPr>
               <a:t>)</a:t>
             </a:r>
             <a:br/>
             <a:r>
-              <a:rPr sz="1800" b="1">
+              <a:rPr>
                 <a:solidFill>
-                  <a:srgbClr val="007020"/>
+                  <a:srgbClr val="06287E"/>
                 </a:solidFill>
                 <a:latin typeface="Courier"/>
               </a:rPr>
               <a:t>class</a:t>
             </a:r>
             <a:r>
-              <a:rPr sz="1800">
+              <a:rPr>
                 <a:latin typeface="Courier"/>
               </a:rPr>
               <a:t>(logical_vector)</a:t>
             </a:r>
           </a:p>
           <a:p>
-            <a:pPr lvl="0" marL="1270000" indent="0">
+            <a:pPr lvl="0" indent="0">
               <a:buNone/>
             </a:pPr>
             <a:r>
-              <a:rPr sz="1800">
+              <a:rPr>
                 <a:latin typeface="Courier"/>
               </a:rPr>
               <a:t>## [1] "logical"</a:t>
@@ -10832,7 +10865,7 @@
               <a:t>The </a:t>
             </a:r>
             <a:r>
-              <a:rPr sz="1800">
+              <a:rPr>
                 <a:latin typeface="Courier"/>
               </a:rPr>
               <a:t>c()</a:t>
@@ -10843,11 +10876,11 @@
             </a:r>
           </a:p>
           <a:p>
-            <a:pPr lvl="0" marL="1270000" indent="0">
+            <a:pPr lvl="0" indent="0">
               <a:buNone/>
             </a:pPr>
             <a:r>
-              <a:rPr sz="1800" i="1">
+              <a:rPr i="1">
                 <a:solidFill>
                   <a:srgbClr val="60A0B0"/>
                 </a:solidFill>
@@ -10857,292 +10890,304 @@
             </a:r>
             <a:br/>
             <a:r>
-              <a:rPr sz="1800">
-                <a:latin typeface="Courier"/>
-              </a:rPr>
-              <a:t>age &lt;-</a:t>
-            </a:r>
-            <a:r>
-              <a:rPr sz="1800">
+              <a:rPr>
+                <a:latin typeface="Courier"/>
+              </a:rPr>
+              <a:t>age </a:t>
+            </a:r>
+            <a:r>
+              <a:rPr>
+                <a:solidFill>
+                  <a:srgbClr val="007020"/>
+                </a:solidFill>
+                <a:latin typeface="Courier"/>
+              </a:rPr>
+              <a:t>&lt;-</a:t>
+            </a:r>
+            <a:r>
+              <a:rPr>
+                <a:latin typeface="Courier"/>
+              </a:rPr>
+              <a:t> </a:t>
+            </a:r>
+            <a:r>
+              <a:rPr>
+                <a:solidFill>
+                  <a:srgbClr val="06287E"/>
+                </a:solidFill>
+                <a:latin typeface="Courier"/>
+              </a:rPr>
+              <a:t>c</a:t>
+            </a:r>
+            <a:r>
+              <a:rPr>
+                <a:latin typeface="Courier"/>
+              </a:rPr>
+              <a:t>(</a:t>
+            </a:r>
+            <a:r>
+              <a:rPr>
+                <a:solidFill>
+                  <a:srgbClr val="40A070"/>
+                </a:solidFill>
+                <a:latin typeface="Courier"/>
+              </a:rPr>
+              <a:t>50</a:t>
+            </a:r>
+            <a:r>
+              <a:rPr>
+                <a:latin typeface="Courier"/>
+              </a:rPr>
+              <a:t>, </a:t>
+            </a:r>
+            <a:r>
+              <a:rPr>
+                <a:solidFill>
+                  <a:srgbClr val="40A070"/>
+                </a:solidFill>
+                <a:latin typeface="Courier"/>
+              </a:rPr>
+              <a:t>25</a:t>
+            </a:r>
+            <a:r>
+              <a:rPr>
+                <a:latin typeface="Courier"/>
+              </a:rPr>
+              <a:t>, </a:t>
+            </a:r>
+            <a:r>
+              <a:rPr>
+                <a:solidFill>
+                  <a:srgbClr val="40A070"/>
+                </a:solidFill>
+                <a:latin typeface="Courier"/>
+              </a:rPr>
+              <a:t>32</a:t>
+            </a:r>
+            <a:r>
+              <a:rPr>
+                <a:latin typeface="Courier"/>
+              </a:rPr>
+              <a:t>, </a:t>
+            </a:r>
+            <a:r>
+              <a:rPr>
+                <a:solidFill>
+                  <a:srgbClr val="40A070"/>
+                </a:solidFill>
+                <a:latin typeface="Courier"/>
+              </a:rPr>
+              <a:t>67</a:t>
+            </a:r>
+            <a:r>
+              <a:rPr>
+                <a:latin typeface="Courier"/>
+              </a:rPr>
+              <a:t>, </a:t>
+            </a:r>
+            <a:r>
+              <a:rPr>
+                <a:solidFill>
+                  <a:srgbClr val="40A070"/>
+                </a:solidFill>
+                <a:latin typeface="Courier"/>
+              </a:rPr>
+              <a:t>46</a:t>
+            </a:r>
+            <a:r>
+              <a:rPr>
+                <a:latin typeface="Courier"/>
+              </a:rPr>
+              <a:t>, </a:t>
+            </a:r>
+            <a:r>
+              <a:rPr>
+                <a:solidFill>
+                  <a:srgbClr val="40A070"/>
+                </a:solidFill>
+                <a:latin typeface="Courier"/>
+              </a:rPr>
+              <a:t>19</a:t>
+            </a:r>
+            <a:r>
+              <a:rPr>
+                <a:latin typeface="Courier"/>
+              </a:rPr>
+              <a:t>)</a:t>
+            </a:r>
+            <a:br/>
+            <a:r>
+              <a:rPr>
+                <a:latin typeface="Courier"/>
+              </a:rPr>
+              <a:t>age</a:t>
+            </a:r>
+          </a:p>
+          <a:p>
+            <a:pPr lvl="0" indent="0">
+              <a:buNone/>
+            </a:pPr>
+            <a:r>
+              <a:rPr>
+                <a:latin typeface="Courier"/>
+              </a:rPr>
+              <a:t>## [1] 50 25 32 67 46 19</a:t>
+            </a:r>
+          </a:p>
+          <a:p>
+            <a:pPr lvl="0" indent="0">
+              <a:buNone/>
+            </a:pPr>
+            <a:r>
+              <a:rPr i="1">
+                <a:solidFill>
+                  <a:srgbClr val="60A0B0"/>
+                </a:solidFill>
+                <a:latin typeface="Courier"/>
+              </a:rPr>
+              <a:t># Storing several peoples' names in one vector.</a:t>
+            </a:r>
+            <a:br/>
+            <a:r>
+              <a:rPr>
+                <a:latin typeface="Courier"/>
+              </a:rPr>
+              <a:t>name </a:t>
+            </a:r>
+            <a:r>
+              <a:rPr>
+                <a:solidFill>
+                  <a:srgbClr val="007020"/>
+                </a:solidFill>
+                <a:latin typeface="Courier"/>
+              </a:rPr>
+              <a:t>&lt;-</a:t>
+            </a:r>
+            <a:r>
+              <a:rPr>
+                <a:latin typeface="Courier"/>
+              </a:rPr>
+              <a:t> </a:t>
+            </a:r>
+            <a:r>
+              <a:rPr>
+                <a:solidFill>
+                  <a:srgbClr val="06287E"/>
+                </a:solidFill>
+                <a:latin typeface="Courier"/>
+              </a:rPr>
+              <a:t>c</a:t>
+            </a:r>
+            <a:r>
+              <a:rPr>
+                <a:latin typeface="Courier"/>
+              </a:rPr>
+              <a:t>(</a:t>
+            </a:r>
+            <a:r>
+              <a:rPr>
                 <a:solidFill>
                   <a:srgbClr val="4070A0"/>
                 </a:solidFill>
                 <a:latin typeface="Courier"/>
               </a:rPr>
-              <a:t> </a:t>
-            </a:r>
-            <a:r>
-              <a:rPr sz="1800" b="1">
-                <a:solidFill>
-                  <a:srgbClr val="007020"/>
-                </a:solidFill>
-                <a:latin typeface="Courier"/>
-              </a:rPr>
-              <a:t>c</a:t>
-            </a:r>
-            <a:r>
-              <a:rPr sz="1800">
-                <a:latin typeface="Courier"/>
-              </a:rPr>
-              <a:t>(</a:t>
-            </a:r>
-            <a:r>
-              <a:rPr sz="1800">
-                <a:solidFill>
-                  <a:srgbClr val="40A070"/>
-                </a:solidFill>
-                <a:latin typeface="Courier"/>
-              </a:rPr>
-              <a:t>50</a:t>
-            </a:r>
-            <a:r>
-              <a:rPr sz="1800">
+              <a:t>"Adam"</a:t>
+            </a:r>
+            <a:r>
+              <a:rPr>
                 <a:latin typeface="Courier"/>
               </a:rPr>
               <a:t>, </a:t>
             </a:r>
             <a:r>
-              <a:rPr sz="1800">
-                <a:solidFill>
-                  <a:srgbClr val="40A070"/>
-                </a:solidFill>
-                <a:latin typeface="Courier"/>
-              </a:rPr>
-              <a:t>25</a:t>
-            </a:r>
-            <a:r>
-              <a:rPr sz="1800">
-                <a:latin typeface="Courier"/>
-              </a:rPr>
-              <a:t>, </a:t>
-            </a:r>
-            <a:r>
-              <a:rPr sz="1800">
-                <a:solidFill>
-                  <a:srgbClr val="40A070"/>
-                </a:solidFill>
-                <a:latin typeface="Courier"/>
-              </a:rPr>
-              <a:t>32</a:t>
-            </a:r>
-            <a:r>
-              <a:rPr sz="1800">
-                <a:latin typeface="Courier"/>
-              </a:rPr>
-              <a:t>, </a:t>
-            </a:r>
-            <a:r>
-              <a:rPr sz="1800">
-                <a:solidFill>
-                  <a:srgbClr val="40A070"/>
-                </a:solidFill>
-                <a:latin typeface="Courier"/>
-              </a:rPr>
-              <a:t>67</a:t>
-            </a:r>
-            <a:r>
-              <a:rPr sz="1800">
-                <a:latin typeface="Courier"/>
-              </a:rPr>
-              <a:t>, </a:t>
-            </a:r>
-            <a:r>
-              <a:rPr sz="1800">
-                <a:solidFill>
-                  <a:srgbClr val="40A070"/>
-                </a:solidFill>
-                <a:latin typeface="Courier"/>
-              </a:rPr>
-              <a:t>46</a:t>
-            </a:r>
-            <a:r>
-              <a:rPr sz="1800">
-                <a:latin typeface="Courier"/>
-              </a:rPr>
-              <a:t>, </a:t>
-            </a:r>
-            <a:r>
-              <a:rPr sz="1800">
-                <a:solidFill>
-                  <a:srgbClr val="40A070"/>
-                </a:solidFill>
-                <a:latin typeface="Courier"/>
-              </a:rPr>
-              <a:t>19</a:t>
-            </a:r>
-            <a:r>
-              <a:rPr sz="1800">
-                <a:latin typeface="Courier"/>
-              </a:rPr>
-              <a:t>)</a:t>
-            </a:r>
-            <a:br/>
-            <a:r>
-              <a:rPr sz="1800">
-                <a:latin typeface="Courier"/>
-              </a:rPr>
-              <a:t>age</a:t>
-            </a:r>
-          </a:p>
-          <a:p>
-            <a:pPr lvl="0" marL="1270000" indent="0">
-              <a:buNone/>
-            </a:pPr>
-            <a:r>
-              <a:rPr sz="1800">
-                <a:latin typeface="Courier"/>
-              </a:rPr>
-              <a:t>## [1] 50 25 32 67 46 19</a:t>
-            </a:r>
-          </a:p>
-          <a:p>
-            <a:pPr lvl="0" marL="1270000" indent="0">
-              <a:buNone/>
-            </a:pPr>
-            <a:r>
-              <a:rPr sz="1800" i="1">
-                <a:solidFill>
-                  <a:srgbClr val="60A0B0"/>
-                </a:solidFill>
-                <a:latin typeface="Courier"/>
-              </a:rPr>
-              <a:t># Storing several peoples' names in one vector.</a:t>
-            </a:r>
-            <a:br/>
-            <a:r>
-              <a:rPr sz="1800">
-                <a:latin typeface="Courier"/>
-              </a:rPr>
-              <a:t>name &lt;-</a:t>
-            </a:r>
-            <a:r>
-              <a:rPr sz="1800">
+              <a:rPr>
                 <a:solidFill>
                   <a:srgbClr val="4070A0"/>
                 </a:solidFill>
                 <a:latin typeface="Courier"/>
               </a:rPr>
-              <a:t> </a:t>
-            </a:r>
-            <a:r>
-              <a:rPr sz="1800" b="1">
-                <a:solidFill>
-                  <a:srgbClr val="007020"/>
-                </a:solidFill>
-                <a:latin typeface="Courier"/>
-              </a:rPr>
-              <a:t>c</a:t>
-            </a:r>
-            <a:r>
-              <a:rPr sz="1800">
-                <a:latin typeface="Courier"/>
-              </a:rPr>
-              <a:t>(</a:t>
-            </a:r>
-            <a:r>
-              <a:rPr sz="1800">
+              <a:t>"Sally"</a:t>
+            </a:r>
+            <a:r>
+              <a:rPr>
+                <a:latin typeface="Courier"/>
+              </a:rPr>
+              <a:t>, </a:t>
+            </a:r>
+            <a:r>
+              <a:rPr>
                 <a:solidFill>
                   <a:srgbClr val="4070A0"/>
                 </a:solidFill>
                 <a:latin typeface="Courier"/>
               </a:rPr>
-              <a:t>"Adam"</a:t>
-            </a:r>
-            <a:r>
-              <a:rPr sz="1800">
+              <a:t>"Eve"</a:t>
+            </a:r>
+            <a:r>
+              <a:rPr>
                 <a:latin typeface="Courier"/>
               </a:rPr>
               <a:t>, </a:t>
             </a:r>
             <a:r>
-              <a:rPr sz="1800">
+              <a:rPr>
                 <a:solidFill>
                   <a:srgbClr val="4070A0"/>
                 </a:solidFill>
                 <a:latin typeface="Courier"/>
               </a:rPr>
-              <a:t>"Sally"</a:t>
-            </a:r>
-            <a:r>
-              <a:rPr sz="1800">
+              <a:t>"John"</a:t>
+            </a:r>
+            <a:r>
+              <a:rPr>
                 <a:latin typeface="Courier"/>
               </a:rPr>
               <a:t>, </a:t>
             </a:r>
             <a:r>
-              <a:rPr sz="1800">
+              <a:rPr>
                 <a:solidFill>
                   <a:srgbClr val="4070A0"/>
                 </a:solidFill>
                 <a:latin typeface="Courier"/>
               </a:rPr>
-              <a:t>"Eve"</a:t>
-            </a:r>
-            <a:r>
-              <a:rPr sz="1800">
+              <a:t>"James"</a:t>
+            </a:r>
+            <a:r>
+              <a:rPr>
                 <a:latin typeface="Courier"/>
               </a:rPr>
               <a:t>, </a:t>
             </a:r>
             <a:r>
-              <a:rPr sz="1800">
+              <a:rPr>
                 <a:solidFill>
                   <a:srgbClr val="4070A0"/>
                 </a:solidFill>
                 <a:latin typeface="Courier"/>
               </a:rPr>
-              <a:t>"John"</a:t>
-            </a:r>
-            <a:r>
-              <a:rPr sz="1800">
-                <a:latin typeface="Courier"/>
-              </a:rPr>
-              <a:t>, </a:t>
-            </a:r>
-            <a:r>
-              <a:rPr sz="1800">
-                <a:solidFill>
-                  <a:srgbClr val="4070A0"/>
-                </a:solidFill>
-                <a:latin typeface="Courier"/>
-              </a:rPr>
-              <a:t>"James"</a:t>
-            </a:r>
-            <a:r>
-              <a:rPr sz="1800">
-                <a:latin typeface="Courier"/>
-              </a:rPr>
-              <a:t>, </a:t>
-            </a:r>
-            <a:r>
-              <a:rPr sz="1800">
-                <a:solidFill>
-                  <a:srgbClr val="4070A0"/>
-                </a:solidFill>
-                <a:latin typeface="Courier"/>
-              </a:rPr>
               <a:t>"Jennifer"</a:t>
             </a:r>
             <a:r>
-              <a:rPr sz="1800">
+              <a:rPr>
                 <a:latin typeface="Courier"/>
               </a:rPr>
               <a:t>)</a:t>
             </a:r>
             <a:br/>
             <a:r>
-              <a:rPr sz="1800">
+              <a:rPr>
                 <a:latin typeface="Courier"/>
               </a:rPr>
               <a:t>name</a:t>
             </a:r>
           </a:p>
           <a:p>
-            <a:pPr lvl="0" marL="1270000" indent="0">
+            <a:pPr lvl="0" indent="0">
               <a:buNone/>
             </a:pPr>
             <a:r>
-              <a:rPr sz="1800">
+              <a:rPr>
                 <a:latin typeface="Courier"/>
               </a:rPr>
               <a:t>## [1] "Adam"     "Sally"    "Eve"      "John"     "James"    "Jennifer"</a:t>
@@ -11269,7 +11314,7 @@
               <a:t>It allocates a number to each element within the vector from left to right, starting with </a:t>
             </a:r>
             <a:r>
-              <a:rPr sz="1800">
+              <a:rPr>
                 <a:latin typeface="Courier"/>
               </a:rPr>
               <a:t>1</a:t>
@@ -11280,11 +11325,11 @@
             </a:r>
           </a:p>
           <a:p>
-            <a:pPr lvl="0" marL="1270000" indent="0">
+            <a:pPr lvl="0" indent="0">
               <a:buNone/>
             </a:pPr>
             <a:r>
-              <a:rPr sz="1800" i="1">
+              <a:rPr i="1">
                 <a:solidFill>
                   <a:srgbClr val="60A0B0"/>
                 </a:solidFill>
@@ -11294,13 +11339,13 @@
             </a:r>
             <a:br/>
             <a:r>
-              <a:rPr sz="1800">
+              <a:rPr>
                 <a:latin typeface="Courier"/>
               </a:rPr>
               <a:t>age[</a:t>
             </a:r>
             <a:r>
-              <a:rPr sz="1800">
+              <a:rPr>
                 <a:solidFill>
                   <a:srgbClr val="40A070"/>
                 </a:solidFill>
@@ -11309,29 +11354,29 @@
               <a:t>2</a:t>
             </a:r>
             <a:r>
-              <a:rPr sz="1800">
+              <a:rPr>
                 <a:latin typeface="Courier"/>
               </a:rPr>
               <a:t>]</a:t>
             </a:r>
           </a:p>
           <a:p>
-            <a:pPr lvl="0" marL="1270000" indent="0">
+            <a:pPr lvl="0" indent="0">
               <a:buNone/>
             </a:pPr>
             <a:r>
-              <a:rPr sz="1800">
+              <a:rPr>
                 <a:latin typeface="Courier"/>
               </a:rPr>
               <a:t>## [1] 25</a:t>
             </a:r>
           </a:p>
           <a:p>
-            <a:pPr lvl="0" marL="1270000" indent="0">
+            <a:pPr lvl="0" indent="0">
               <a:buNone/>
             </a:pPr>
             <a:r>
-              <a:rPr sz="1800" i="1">
+              <a:rPr i="1">
                 <a:solidFill>
                   <a:srgbClr val="60A0B0"/>
                 </a:solidFill>
@@ -11341,13 +11386,13 @@
             </a:r>
             <a:br/>
             <a:r>
-              <a:rPr sz="1800">
+              <a:rPr>
                 <a:latin typeface="Courier"/>
               </a:rPr>
               <a:t>age[</a:t>
             </a:r>
             <a:r>
-              <a:rPr sz="1800">
+              <a:rPr>
                 <a:solidFill>
                   <a:srgbClr val="40A070"/>
                 </a:solidFill>
@@ -11356,29 +11401,29 @@
               <a:t>4</a:t>
             </a:r>
             <a:r>
-              <a:rPr sz="1800">
+              <a:rPr>
                 <a:latin typeface="Courier"/>
               </a:rPr>
               <a:t>]</a:t>
             </a:r>
           </a:p>
           <a:p>
-            <a:pPr lvl="0" marL="1270000" indent="0">
+            <a:pPr lvl="0" indent="0">
               <a:buNone/>
             </a:pPr>
             <a:r>
-              <a:rPr sz="1800">
+              <a:rPr>
                 <a:latin typeface="Courier"/>
               </a:rPr>
               <a:t>## [1] 67</a:t>
             </a:r>
           </a:p>
           <a:p>
-            <a:pPr lvl="0" marL="1270000" indent="0">
+            <a:pPr lvl="0" indent="0">
               <a:buNone/>
             </a:pPr>
             <a:r>
-              <a:rPr sz="1800" i="1">
+              <a:rPr i="1">
                 <a:solidFill>
                   <a:srgbClr val="60A0B0"/>
                 </a:solidFill>
@@ -11388,13 +11433,13 @@
             </a:r>
             <a:br/>
             <a:r>
-              <a:rPr sz="1800">
+              <a:rPr>
                 <a:latin typeface="Courier"/>
               </a:rPr>
               <a:t>name[</a:t>
             </a:r>
             <a:r>
-              <a:rPr sz="1800">
+              <a:rPr>
                 <a:solidFill>
                   <a:srgbClr val="40A070"/>
                 </a:solidFill>
@@ -11403,18 +11448,18 @@
               <a:t>5</a:t>
             </a:r>
             <a:r>
-              <a:rPr sz="1800">
+              <a:rPr>
                 <a:latin typeface="Courier"/>
               </a:rPr>
               <a:t>]</a:t>
             </a:r>
           </a:p>
           <a:p>
-            <a:pPr lvl="0" marL="1270000" indent="0">
+            <a:pPr lvl="0" indent="0">
               <a:buNone/>
             </a:pPr>
             <a:r>
-              <a:rPr sz="1800">
+              <a:rPr>
                 <a:latin typeface="Courier"/>
               </a:rPr>
               <a:t>## [1] "James"</a:t>
@@ -11541,7 +11586,7 @@
               <a:t>Thus, what would happen if we were to add a value of </a:t>
             </a:r>
             <a:r>
-              <a:rPr sz="1800">
+              <a:rPr>
                 <a:latin typeface="Courier"/>
               </a:rPr>
               <a:t>TRUE</a:t>
@@ -11558,7 +11603,7 @@
               <a:t>Use </a:t>
             </a:r>
             <a:r>
-              <a:rPr sz="1800">
+              <a:rPr>
                 <a:latin typeface="Courier"/>
               </a:rPr>
               <a:t>class()</a:t>
@@ -11569,11 +11614,11 @@
             </a:r>
           </a:p>
           <a:p>
-            <a:pPr lvl="0" marL="1270000" indent="0">
+            <a:pPr lvl="0" indent="0">
               <a:buNone/>
             </a:pPr>
             <a:r>
-              <a:rPr sz="1800" i="1">
+              <a:rPr i="1">
                 <a:solidFill>
                   <a:srgbClr val="60A0B0"/>
                 </a:solidFill>
@@ -11583,37 +11628,43 @@
             </a:r>
             <a:br/>
             <a:r>
-              <a:rPr sz="1800">
-                <a:latin typeface="Courier"/>
-              </a:rPr>
-              <a:t>test &lt;-</a:t>
-            </a:r>
-            <a:r>
-              <a:rPr sz="1800">
-                <a:solidFill>
-                  <a:srgbClr val="4070A0"/>
-                </a:solidFill>
-                <a:latin typeface="Courier"/>
-              </a:rPr>
-              <a:t> </a:t>
-            </a:r>
-            <a:r>
-              <a:rPr sz="1800" b="1">
+              <a:rPr>
+                <a:latin typeface="Courier"/>
+              </a:rPr>
+              <a:t>test </a:t>
+            </a:r>
+            <a:r>
+              <a:rPr>
                 <a:solidFill>
                   <a:srgbClr val="007020"/>
                 </a:solidFill>
                 <a:latin typeface="Courier"/>
               </a:rPr>
+              <a:t>&lt;-</a:t>
+            </a:r>
+            <a:r>
+              <a:rPr>
+                <a:latin typeface="Courier"/>
+              </a:rPr>
+              <a:t> </a:t>
+            </a:r>
+            <a:r>
+              <a:rPr>
+                <a:solidFill>
+                  <a:srgbClr val="06287E"/>
+                </a:solidFill>
+                <a:latin typeface="Courier"/>
+              </a:rPr>
               <a:t>c</a:t>
             </a:r>
             <a:r>
-              <a:rPr sz="1800">
+              <a:rPr>
                 <a:latin typeface="Courier"/>
               </a:rPr>
               <a:t>(</a:t>
             </a:r>
             <a:r>
-              <a:rPr sz="1800">
+              <a:rPr>
                 <a:solidFill>
                   <a:srgbClr val="40A070"/>
                 </a:solidFill>
@@ -11622,13 +11673,13 @@
               <a:t>1</a:t>
             </a:r>
             <a:r>
-              <a:rPr sz="1800">
+              <a:rPr>
                 <a:latin typeface="Courier"/>
               </a:rPr>
               <a:t>, </a:t>
             </a:r>
             <a:r>
-              <a:rPr sz="1800">
+              <a:rPr>
                 <a:solidFill>
                   <a:srgbClr val="40A070"/>
                 </a:solidFill>
@@ -11637,13 +11688,13 @@
               <a:t>2</a:t>
             </a:r>
             <a:r>
-              <a:rPr sz="1800">
+              <a:rPr>
                 <a:latin typeface="Courier"/>
               </a:rPr>
               <a:t>, </a:t>
             </a:r>
             <a:r>
-              <a:rPr sz="1800">
+              <a:rPr>
                 <a:solidFill>
                   <a:srgbClr val="40A070"/>
                 </a:solidFill>
@@ -11652,13 +11703,13 @@
               <a:t>3</a:t>
             </a:r>
             <a:r>
-              <a:rPr sz="1800">
+              <a:rPr>
                 <a:latin typeface="Courier"/>
               </a:rPr>
               <a:t>, </a:t>
             </a:r>
             <a:r>
-              <a:rPr sz="1800">
+              <a:rPr>
                 <a:solidFill>
                   <a:srgbClr val="40A070"/>
                 </a:solidFill>
@@ -11667,22 +11718,22 @@
               <a:t>4</a:t>
             </a:r>
             <a:r>
-              <a:rPr sz="1800">
+              <a:rPr>
                 <a:latin typeface="Courier"/>
               </a:rPr>
               <a:t>, </a:t>
             </a:r>
             <a:r>
-              <a:rPr sz="1800">
+              <a:rPr>
                 <a:solidFill>
-                  <a:srgbClr val="007020"/>
+                  <a:srgbClr val="880000"/>
                 </a:solidFill>
                 <a:latin typeface="Courier"/>
               </a:rPr>
               <a:t>TRUE</a:t>
             </a:r>
             <a:r>
-              <a:rPr sz="1800">
+              <a:rPr>
                 <a:latin typeface="Courier"/>
               </a:rPr>
               <a:t>)</a:t>
@@ -11796,11 +11847,11 @@
           <a:bodyPr/>
           <a:lstStyle/>
           <a:p>
-            <a:pPr lvl="0" marL="1270000" indent="0">
+            <a:pPr lvl="0" indent="0">
               <a:buNone/>
             </a:pPr>
             <a:r>
-              <a:rPr sz="1800" i="1">
+              <a:rPr i="1">
                 <a:solidFill>
                   <a:srgbClr val="60A0B0"/>
                 </a:solidFill>
@@ -11810,29 +11861,29 @@
             </a:r>
             <a:br/>
             <a:r>
-              <a:rPr sz="1800">
+              <a:rPr>
                 <a:latin typeface="Courier"/>
               </a:rPr>
               <a:t>test</a:t>
             </a:r>
           </a:p>
           <a:p>
-            <a:pPr lvl="0" marL="1270000" indent="0">
+            <a:pPr lvl="0" indent="0">
               <a:buNone/>
             </a:pPr>
             <a:r>
-              <a:rPr sz="1800">
+              <a:rPr>
                 <a:latin typeface="Courier"/>
               </a:rPr>
               <a:t>## [1] 1 2 3 4 1</a:t>
             </a:r>
           </a:p>
           <a:p>
-            <a:pPr lvl="0" marL="1270000" indent="0">
+            <a:pPr lvl="0" indent="0">
               <a:buNone/>
             </a:pPr>
             <a:r>
-              <a:rPr sz="1800" i="1">
+              <a:rPr i="1">
                 <a:solidFill>
                   <a:srgbClr val="60A0B0"/>
                 </a:solidFill>
@@ -11842,27 +11893,27 @@
             </a:r>
             <a:br/>
             <a:r>
-              <a:rPr sz="1800" b="1">
+              <a:rPr>
                 <a:solidFill>
-                  <a:srgbClr val="007020"/>
+                  <a:srgbClr val="06287E"/>
                 </a:solidFill>
                 <a:latin typeface="Courier"/>
               </a:rPr>
               <a:t>class</a:t>
             </a:r>
             <a:r>
-              <a:rPr sz="1800">
+              <a:rPr>
                 <a:latin typeface="Courier"/>
               </a:rPr>
               <a:t>(test)</a:t>
             </a:r>
           </a:p>
           <a:p>
-            <a:pPr lvl="0" marL="1270000" indent="0">
+            <a:pPr lvl="0" indent="0">
               <a:buNone/>
             </a:pPr>
             <a:r>
-              <a:rPr sz="1800">
+              <a:rPr>
                 <a:latin typeface="Courier"/>
               </a:rPr>
               <a:t>## [1] "numeric"</a:t>
@@ -11875,7 +11926,7 @@
               <a:t>The value of </a:t>
             </a:r>
             <a:r>
-              <a:rPr sz="1800">
+              <a:rPr>
                 <a:latin typeface="Courier"/>
               </a:rPr>
               <a:t>TRUE</a:t>
@@ -11899,7 +11950,7 @@
               <a:t>This is because logical vectors (i.e. </a:t>
             </a:r>
             <a:r>
-              <a:rPr sz="1800">
+              <a:rPr>
                 <a:latin typeface="Courier"/>
               </a:rPr>
               <a:t>TRUE</a:t>
@@ -11909,7 +11960,7 @@
               <a:t>/</a:t>
             </a:r>
             <a:r>
-              <a:rPr sz="1800">
+              <a:rPr>
                 <a:latin typeface="Courier"/>
               </a:rPr>
               <a:t>FALSE</a:t>
@@ -12163,110 +12214,116 @@
             </a:r>
           </a:p>
           <a:p>
-            <a:pPr lvl="0" marL="1270000" indent="0">
+            <a:pPr lvl="0" indent="0">
               <a:buNone/>
             </a:pPr>
             <a:r>
-              <a:rPr sz="1800">
-                <a:latin typeface="Courier"/>
-              </a:rPr>
-              <a:t>test2 &lt;-</a:t>
-            </a:r>
-            <a:r>
-              <a:rPr sz="1800">
+              <a:rPr>
+                <a:latin typeface="Courier"/>
+              </a:rPr>
+              <a:t>test2 </a:t>
+            </a:r>
+            <a:r>
+              <a:rPr>
+                <a:solidFill>
+                  <a:srgbClr val="007020"/>
+                </a:solidFill>
+                <a:latin typeface="Courier"/>
+              </a:rPr>
+              <a:t>&lt;-</a:t>
+            </a:r>
+            <a:r>
+              <a:rPr>
+                <a:latin typeface="Courier"/>
+              </a:rPr>
+              <a:t> </a:t>
+            </a:r>
+            <a:r>
+              <a:rPr>
+                <a:solidFill>
+                  <a:srgbClr val="06287E"/>
+                </a:solidFill>
+                <a:latin typeface="Courier"/>
+              </a:rPr>
+              <a:t>c</a:t>
+            </a:r>
+            <a:r>
+              <a:rPr>
+                <a:latin typeface="Courier"/>
+              </a:rPr>
+              <a:t>(</a:t>
+            </a:r>
+            <a:r>
+              <a:rPr>
+                <a:solidFill>
+                  <a:srgbClr val="40A070"/>
+                </a:solidFill>
+                <a:latin typeface="Courier"/>
+              </a:rPr>
+              <a:t>1</a:t>
+            </a:r>
+            <a:r>
+              <a:rPr>
+                <a:latin typeface="Courier"/>
+              </a:rPr>
+              <a:t>, </a:t>
+            </a:r>
+            <a:r>
+              <a:rPr>
+                <a:solidFill>
+                  <a:srgbClr val="40A070"/>
+                </a:solidFill>
+                <a:latin typeface="Courier"/>
+              </a:rPr>
+              <a:t>2</a:t>
+            </a:r>
+            <a:r>
+              <a:rPr>
+                <a:latin typeface="Courier"/>
+              </a:rPr>
+              <a:t>, </a:t>
+            </a:r>
+            <a:r>
+              <a:rPr>
+                <a:solidFill>
+                  <a:srgbClr val="40A070"/>
+                </a:solidFill>
+                <a:latin typeface="Courier"/>
+              </a:rPr>
+              <a:t>3</a:t>
+            </a:r>
+            <a:r>
+              <a:rPr>
+                <a:latin typeface="Courier"/>
+              </a:rPr>
+              <a:t>, </a:t>
+            </a:r>
+            <a:r>
+              <a:rPr>
+                <a:solidFill>
+                  <a:srgbClr val="40A070"/>
+                </a:solidFill>
+                <a:latin typeface="Courier"/>
+              </a:rPr>
+              <a:t>4</a:t>
+            </a:r>
+            <a:r>
+              <a:rPr>
+                <a:latin typeface="Courier"/>
+              </a:rPr>
+              <a:t>, </a:t>
+            </a:r>
+            <a:r>
+              <a:rPr>
                 <a:solidFill>
                   <a:srgbClr val="4070A0"/>
                 </a:solidFill>
                 <a:latin typeface="Courier"/>
               </a:rPr>
-              <a:t> </a:t>
-            </a:r>
-            <a:r>
-              <a:rPr sz="1800" b="1">
-                <a:solidFill>
-                  <a:srgbClr val="007020"/>
-                </a:solidFill>
-                <a:latin typeface="Courier"/>
-              </a:rPr>
-              <a:t>c</a:t>
-            </a:r>
-            <a:r>
-              <a:rPr sz="1800">
-                <a:latin typeface="Courier"/>
-              </a:rPr>
-              <a:t>(</a:t>
-            </a:r>
-            <a:r>
-              <a:rPr sz="1800">
-                <a:solidFill>
-                  <a:srgbClr val="40A070"/>
-                </a:solidFill>
-                <a:latin typeface="Courier"/>
-              </a:rPr>
-              <a:t>1</a:t>
-            </a:r>
-            <a:r>
-              <a:rPr sz="1800">
-                <a:latin typeface="Courier"/>
-              </a:rPr>
-              <a:t>, </a:t>
-            </a:r>
-            <a:r>
-              <a:rPr sz="1800">
-                <a:solidFill>
-                  <a:srgbClr val="40A070"/>
-                </a:solidFill>
-                <a:latin typeface="Courier"/>
-              </a:rPr>
-              <a:t>2</a:t>
-            </a:r>
-            <a:r>
-              <a:rPr sz="1800">
-                <a:latin typeface="Courier"/>
-              </a:rPr>
-              <a:t>, </a:t>
-            </a:r>
-            <a:r>
-              <a:rPr sz="1800">
-                <a:solidFill>
-                  <a:srgbClr val="40A070"/>
-                </a:solidFill>
-                <a:latin typeface="Courier"/>
-              </a:rPr>
-              <a:t>3</a:t>
-            </a:r>
-            <a:r>
-              <a:rPr sz="1800">
-                <a:latin typeface="Courier"/>
-              </a:rPr>
-              <a:t>, </a:t>
-            </a:r>
-            <a:r>
-              <a:rPr sz="1800">
-                <a:solidFill>
-                  <a:srgbClr val="40A070"/>
-                </a:solidFill>
-                <a:latin typeface="Courier"/>
-              </a:rPr>
-              <a:t>4</a:t>
-            </a:r>
-            <a:r>
-              <a:rPr sz="1800">
-                <a:latin typeface="Courier"/>
-              </a:rPr>
-              <a:t>, </a:t>
-            </a:r>
-            <a:r>
-              <a:rPr sz="1800">
-                <a:solidFill>
-                  <a:srgbClr val="4070A0"/>
-                </a:solidFill>
-                <a:latin typeface="Courier"/>
-              </a:rPr>
               <a:t>"hi"</a:t>
             </a:r>
             <a:r>
-              <a:rPr sz="1800">
+              <a:rPr>
                 <a:latin typeface="Courier"/>
               </a:rPr>
               <a:t>)</a:t>
@@ -12279,7 +12336,7 @@
               <a:t>Recall the vector and use </a:t>
             </a:r>
             <a:r>
-              <a:rPr sz="1800">
+              <a:rPr>
                 <a:latin typeface="Courier"/>
               </a:rPr>
               <a:t>class()</a:t>
@@ -12397,11 +12454,11 @@
           <a:bodyPr/>
           <a:lstStyle/>
           <a:p>
-            <a:pPr lvl="0" marL="1270000" indent="0">
+            <a:pPr lvl="0" indent="0">
               <a:buNone/>
             </a:pPr>
             <a:r>
-              <a:rPr sz="1800" i="1">
+              <a:rPr i="1">
                 <a:solidFill>
                   <a:srgbClr val="60A0B0"/>
                 </a:solidFill>
@@ -12411,29 +12468,29 @@
             </a:r>
             <a:br/>
             <a:r>
-              <a:rPr sz="1800">
+              <a:rPr>
                 <a:latin typeface="Courier"/>
               </a:rPr>
               <a:t>test2</a:t>
             </a:r>
           </a:p>
           <a:p>
-            <a:pPr lvl="0" marL="1270000" indent="0">
+            <a:pPr lvl="0" indent="0">
               <a:buNone/>
             </a:pPr>
             <a:r>
-              <a:rPr sz="1800">
+              <a:rPr>
                 <a:latin typeface="Courier"/>
               </a:rPr>
               <a:t>## [1] "1"  "2"  "3"  "4"  "hi"</a:t>
             </a:r>
           </a:p>
           <a:p>
-            <a:pPr lvl="0" marL="1270000" indent="0">
+            <a:pPr lvl="0" indent="0">
               <a:buNone/>
             </a:pPr>
             <a:r>
-              <a:rPr sz="1800" i="1">
+              <a:rPr i="1">
                 <a:solidFill>
                   <a:srgbClr val="60A0B0"/>
                 </a:solidFill>
@@ -12443,27 +12500,27 @@
             </a:r>
             <a:br/>
             <a:r>
-              <a:rPr sz="1800" b="1">
+              <a:rPr>
                 <a:solidFill>
-                  <a:srgbClr val="007020"/>
+                  <a:srgbClr val="06287E"/>
                 </a:solidFill>
                 <a:latin typeface="Courier"/>
               </a:rPr>
               <a:t>class</a:t>
             </a:r>
             <a:r>
-              <a:rPr sz="1800">
+              <a:rPr>
                 <a:latin typeface="Courier"/>
               </a:rPr>
               <a:t>(test2)</a:t>
             </a:r>
           </a:p>
           <a:p>
-            <a:pPr lvl="0" marL="1270000" indent="0">
+            <a:pPr lvl="0" indent="0">
               <a:buNone/>
             </a:pPr>
             <a:r>
-              <a:rPr sz="1800">
+              <a:rPr>
                 <a:latin typeface="Courier"/>
               </a:rPr>
               <a:t>## [1] "character"</a:t>
@@ -12574,11 +12631,11 @@
             </a:r>
           </a:p>
           <a:p>
-            <a:pPr lvl="0" marL="1270000" indent="0">
+            <a:pPr lvl="0" indent="0">
               <a:buNone/>
             </a:pPr>
             <a:r>
-              <a:rPr sz="1800">
+              <a:rPr>
                 <a:latin typeface="Courier"/>
               </a:rPr>
               <a:t>##       name age gender
@@ -12728,7 +12785,7 @@
           <a:p>
             <a:pPr lvl="2"/>
             <a:r>
-              <a:rPr sz="1800">
+              <a:rPr>
                 <a:latin typeface="Courier"/>
               </a:rPr>
               <a:t>Name: "Adam", "Sally", "Eve", "John", "James", "Jennifer"</a:t>
@@ -12737,7 +12794,7 @@
           <a:p>
             <a:pPr lvl="2"/>
             <a:r>
-              <a:rPr sz="1800">
+              <a:rPr>
                 <a:latin typeface="Courier"/>
               </a:rPr>
               <a:t>Age: 50, 25, 32, 67, 46, 19</a:t>
@@ -12746,7 +12803,7 @@
           <a:p>
             <a:pPr lvl="2"/>
             <a:r>
-              <a:rPr sz="1800">
+              <a:rPr>
                 <a:latin typeface="Courier"/>
               </a:rPr>
               <a:t>Gender: "male", "female", "female", "male", "male", "female"</a:t>
@@ -12894,7 +12951,7 @@
               <a:t>Combine these vectors into a data frame using </a:t>
             </a:r>
             <a:r>
-              <a:rPr sz="1800">
+              <a:rPr>
                 <a:latin typeface="Courier"/>
               </a:rPr>
               <a:t>data.frame()</a:t>
@@ -12911,7 +12968,7 @@
               <a:t>Hint, the vector names need to go inside the </a:t>
             </a:r>
             <a:r>
-              <a:rPr sz="1800">
+              <a:rPr>
                 <a:latin typeface="Courier"/>
               </a:rPr>
               <a:t>()</a:t>
@@ -12928,7 +12985,7 @@
               <a:t>Save the data frame under the name </a:t>
             </a:r>
             <a:r>
-              <a:rPr sz="1800">
+              <a:rPr>
                 <a:latin typeface="Courier"/>
               </a:rPr>
               <a:t>patients</a:t>
@@ -12945,7 +13002,7 @@
               <a:t>Print the data frame called </a:t>
             </a:r>
             <a:r>
-              <a:rPr sz="1800">
+              <a:rPr>
                 <a:latin typeface="Courier"/>
               </a:rPr>
               <a:t>patients</a:t>
@@ -13063,11 +13120,11 @@
           <a:bodyPr/>
           <a:lstStyle/>
           <a:p>
-            <a:pPr lvl="0" marL="1270000" indent="0">
+            <a:pPr lvl="0" indent="0">
               <a:buNone/>
             </a:pPr>
             <a:r>
-              <a:rPr sz="1800" i="1">
+              <a:rPr i="1">
                 <a:solidFill>
                   <a:srgbClr val="60A0B0"/>
                 </a:solidFill>
@@ -13078,407 +13135,431 @@
             <a:br/>
             <a:br/>
             <a:r>
-              <a:rPr sz="1800">
-                <a:latin typeface="Courier"/>
-              </a:rPr>
-              <a:t>name &lt;-</a:t>
-            </a:r>
-            <a:r>
-              <a:rPr sz="1800">
+              <a:rPr>
+                <a:latin typeface="Courier"/>
+              </a:rPr>
+              <a:t>name </a:t>
+            </a:r>
+            <a:r>
+              <a:rPr>
+                <a:solidFill>
+                  <a:srgbClr val="007020"/>
+                </a:solidFill>
+                <a:latin typeface="Courier"/>
+              </a:rPr>
+              <a:t>&lt;-</a:t>
+            </a:r>
+            <a:r>
+              <a:rPr>
+                <a:latin typeface="Courier"/>
+              </a:rPr>
+              <a:t> </a:t>
+            </a:r>
+            <a:r>
+              <a:rPr>
+                <a:solidFill>
+                  <a:srgbClr val="06287E"/>
+                </a:solidFill>
+                <a:latin typeface="Courier"/>
+              </a:rPr>
+              <a:t>c</a:t>
+            </a:r>
+            <a:r>
+              <a:rPr>
+                <a:latin typeface="Courier"/>
+              </a:rPr>
+              <a:t>(</a:t>
+            </a:r>
+            <a:r>
+              <a:rPr>
                 <a:solidFill>
                   <a:srgbClr val="4070A0"/>
                 </a:solidFill>
                 <a:latin typeface="Courier"/>
               </a:rPr>
-              <a:t> </a:t>
-            </a:r>
-            <a:r>
-              <a:rPr sz="1800" b="1">
+              <a:t>"Adam"</a:t>
+            </a:r>
+            <a:r>
+              <a:rPr>
+                <a:latin typeface="Courier"/>
+              </a:rPr>
+              <a:t>, </a:t>
+            </a:r>
+            <a:r>
+              <a:rPr>
+                <a:solidFill>
+                  <a:srgbClr val="4070A0"/>
+                </a:solidFill>
+                <a:latin typeface="Courier"/>
+              </a:rPr>
+              <a:t>"Sally"</a:t>
+            </a:r>
+            <a:r>
+              <a:rPr>
+                <a:latin typeface="Courier"/>
+              </a:rPr>
+              <a:t>, </a:t>
+            </a:r>
+            <a:r>
+              <a:rPr>
+                <a:solidFill>
+                  <a:srgbClr val="4070A0"/>
+                </a:solidFill>
+                <a:latin typeface="Courier"/>
+              </a:rPr>
+              <a:t>"Eve"</a:t>
+            </a:r>
+            <a:r>
+              <a:rPr>
+                <a:latin typeface="Courier"/>
+              </a:rPr>
+              <a:t>, </a:t>
+            </a:r>
+            <a:r>
+              <a:rPr>
+                <a:solidFill>
+                  <a:srgbClr val="4070A0"/>
+                </a:solidFill>
+                <a:latin typeface="Courier"/>
+              </a:rPr>
+              <a:t>"John"</a:t>
+            </a:r>
+            <a:r>
+              <a:rPr>
+                <a:latin typeface="Courier"/>
+              </a:rPr>
+              <a:t>, </a:t>
+            </a:r>
+            <a:r>
+              <a:rPr>
+                <a:solidFill>
+                  <a:srgbClr val="4070A0"/>
+                </a:solidFill>
+                <a:latin typeface="Courier"/>
+              </a:rPr>
+              <a:t>"James"</a:t>
+            </a:r>
+            <a:r>
+              <a:rPr>
+                <a:latin typeface="Courier"/>
+              </a:rPr>
+              <a:t>, </a:t>
+            </a:r>
+            <a:r>
+              <a:rPr>
+                <a:solidFill>
+                  <a:srgbClr val="4070A0"/>
+                </a:solidFill>
+                <a:latin typeface="Courier"/>
+              </a:rPr>
+              <a:t>"Jennifer"</a:t>
+            </a:r>
+            <a:r>
+              <a:rPr>
+                <a:latin typeface="Courier"/>
+              </a:rPr>
+              <a:t>)</a:t>
+            </a:r>
+            <a:br/>
+            <a:r>
+              <a:rPr>
+                <a:latin typeface="Courier"/>
+              </a:rPr>
+              <a:t>age </a:t>
+            </a:r>
+            <a:r>
+              <a:rPr>
                 <a:solidFill>
                   <a:srgbClr val="007020"/>
                 </a:solidFill>
                 <a:latin typeface="Courier"/>
               </a:rPr>
+              <a:t>&lt;-</a:t>
+            </a:r>
+            <a:r>
+              <a:rPr>
+                <a:latin typeface="Courier"/>
+              </a:rPr>
+              <a:t> </a:t>
+            </a:r>
+            <a:r>
+              <a:rPr>
+                <a:solidFill>
+                  <a:srgbClr val="06287E"/>
+                </a:solidFill>
+                <a:latin typeface="Courier"/>
+              </a:rPr>
               <a:t>c</a:t>
             </a:r>
             <a:r>
-              <a:rPr sz="1800">
+              <a:rPr>
                 <a:latin typeface="Courier"/>
               </a:rPr>
               <a:t>(</a:t>
             </a:r>
             <a:r>
-              <a:rPr sz="1800">
+              <a:rPr>
+                <a:solidFill>
+                  <a:srgbClr val="40A070"/>
+                </a:solidFill>
+                <a:latin typeface="Courier"/>
+              </a:rPr>
+              <a:t>50</a:t>
+            </a:r>
+            <a:r>
+              <a:rPr>
+                <a:latin typeface="Courier"/>
+              </a:rPr>
+              <a:t>, </a:t>
+            </a:r>
+            <a:r>
+              <a:rPr>
+                <a:solidFill>
+                  <a:srgbClr val="40A070"/>
+                </a:solidFill>
+                <a:latin typeface="Courier"/>
+              </a:rPr>
+              <a:t>25</a:t>
+            </a:r>
+            <a:r>
+              <a:rPr>
+                <a:latin typeface="Courier"/>
+              </a:rPr>
+              <a:t>, </a:t>
+            </a:r>
+            <a:r>
+              <a:rPr>
+                <a:solidFill>
+                  <a:srgbClr val="40A070"/>
+                </a:solidFill>
+                <a:latin typeface="Courier"/>
+              </a:rPr>
+              <a:t>32</a:t>
+            </a:r>
+            <a:r>
+              <a:rPr>
+                <a:latin typeface="Courier"/>
+              </a:rPr>
+              <a:t>, </a:t>
+            </a:r>
+            <a:r>
+              <a:rPr>
+                <a:solidFill>
+                  <a:srgbClr val="40A070"/>
+                </a:solidFill>
+                <a:latin typeface="Courier"/>
+              </a:rPr>
+              <a:t>67</a:t>
+            </a:r>
+            <a:r>
+              <a:rPr>
+                <a:latin typeface="Courier"/>
+              </a:rPr>
+              <a:t>, </a:t>
+            </a:r>
+            <a:r>
+              <a:rPr>
+                <a:solidFill>
+                  <a:srgbClr val="40A070"/>
+                </a:solidFill>
+                <a:latin typeface="Courier"/>
+              </a:rPr>
+              <a:t>46</a:t>
+            </a:r>
+            <a:r>
+              <a:rPr>
+                <a:latin typeface="Courier"/>
+              </a:rPr>
+              <a:t>, </a:t>
+            </a:r>
+            <a:r>
+              <a:rPr>
+                <a:solidFill>
+                  <a:srgbClr val="40A070"/>
+                </a:solidFill>
+                <a:latin typeface="Courier"/>
+              </a:rPr>
+              <a:t>19</a:t>
+            </a:r>
+            <a:r>
+              <a:rPr>
+                <a:latin typeface="Courier"/>
+              </a:rPr>
+              <a:t>)</a:t>
+            </a:r>
+            <a:br/>
+            <a:r>
+              <a:rPr>
+                <a:latin typeface="Courier"/>
+              </a:rPr>
+              <a:t>gender </a:t>
+            </a:r>
+            <a:r>
+              <a:rPr>
+                <a:solidFill>
+                  <a:srgbClr val="007020"/>
+                </a:solidFill>
+                <a:latin typeface="Courier"/>
+              </a:rPr>
+              <a:t>&lt;-</a:t>
+            </a:r>
+            <a:r>
+              <a:rPr>
+                <a:latin typeface="Courier"/>
+              </a:rPr>
+              <a:t> </a:t>
+            </a:r>
+            <a:r>
+              <a:rPr>
+                <a:solidFill>
+                  <a:srgbClr val="06287E"/>
+                </a:solidFill>
+                <a:latin typeface="Courier"/>
+              </a:rPr>
+              <a:t>c</a:t>
+            </a:r>
+            <a:r>
+              <a:rPr>
+                <a:latin typeface="Courier"/>
+              </a:rPr>
+              <a:t>(</a:t>
+            </a:r>
+            <a:r>
+              <a:rPr>
                 <a:solidFill>
                   <a:srgbClr val="4070A0"/>
                 </a:solidFill>
                 <a:latin typeface="Courier"/>
               </a:rPr>
-              <a:t>"Adam"</a:t>
-            </a:r>
-            <a:r>
-              <a:rPr sz="1800">
+              <a:t>"male"</a:t>
+            </a:r>
+            <a:r>
+              <a:rPr>
                 <a:latin typeface="Courier"/>
               </a:rPr>
               <a:t>, </a:t>
             </a:r>
             <a:r>
-              <a:rPr sz="1800">
+              <a:rPr>
                 <a:solidFill>
                   <a:srgbClr val="4070A0"/>
                 </a:solidFill>
                 <a:latin typeface="Courier"/>
               </a:rPr>
-              <a:t>"Sally"</a:t>
-            </a:r>
-            <a:r>
-              <a:rPr sz="1800">
+              <a:t>"female"</a:t>
+            </a:r>
+            <a:r>
+              <a:rPr>
                 <a:latin typeface="Courier"/>
               </a:rPr>
               <a:t>, </a:t>
             </a:r>
             <a:r>
-              <a:rPr sz="1800">
+              <a:rPr>
                 <a:solidFill>
                   <a:srgbClr val="4070A0"/>
                 </a:solidFill>
                 <a:latin typeface="Courier"/>
               </a:rPr>
-              <a:t>"Eve"</a:t>
-            </a:r>
-            <a:r>
-              <a:rPr sz="1800">
+              <a:t>"female"</a:t>
+            </a:r>
+            <a:r>
+              <a:rPr>
                 <a:latin typeface="Courier"/>
               </a:rPr>
               <a:t>, </a:t>
             </a:r>
             <a:r>
-              <a:rPr sz="1800">
+              <a:rPr>
                 <a:solidFill>
                   <a:srgbClr val="4070A0"/>
                 </a:solidFill>
                 <a:latin typeface="Courier"/>
               </a:rPr>
-              <a:t>"John"</a:t>
-            </a:r>
-            <a:r>
-              <a:rPr sz="1800">
+              <a:t>"male"</a:t>
+            </a:r>
+            <a:r>
+              <a:rPr>
                 <a:latin typeface="Courier"/>
               </a:rPr>
               <a:t>, </a:t>
             </a:r>
             <a:r>
-              <a:rPr sz="1800">
+              <a:rPr>
                 <a:solidFill>
                   <a:srgbClr val="4070A0"/>
                 </a:solidFill>
                 <a:latin typeface="Courier"/>
               </a:rPr>
-              <a:t>"James"</a:t>
-            </a:r>
-            <a:r>
-              <a:rPr sz="1800">
+              <a:t>"male"</a:t>
+            </a:r>
+            <a:r>
+              <a:rPr>
                 <a:latin typeface="Courier"/>
               </a:rPr>
               <a:t>, </a:t>
             </a:r>
             <a:r>
-              <a:rPr sz="1800">
+              <a:rPr>
                 <a:solidFill>
                   <a:srgbClr val="4070A0"/>
                 </a:solidFill>
                 <a:latin typeface="Courier"/>
               </a:rPr>
-              <a:t>"Jennifer"</a:t>
-            </a:r>
-            <a:r>
-              <a:rPr sz="1800">
+              <a:t>"female"</a:t>
+            </a:r>
+            <a:r>
+              <a:rPr>
                 <a:latin typeface="Courier"/>
               </a:rPr>
               <a:t>)</a:t>
             </a:r>
             <a:br/>
-            <a:r>
-              <a:rPr sz="1800">
-                <a:latin typeface="Courier"/>
-              </a:rPr>
-              <a:t>age &lt;-</a:t>
-            </a:r>
-            <a:r>
-              <a:rPr sz="1800">
+            <a:br/>
+            <a:br/>
+            <a:r>
+              <a:rPr i="1">
                 <a:solidFill>
-                  <a:srgbClr val="4070A0"/>
+                  <a:srgbClr val="60A0B0"/>
                 </a:solidFill>
                 <a:latin typeface="Courier"/>
               </a:rPr>
-              <a:t> </a:t>
-            </a:r>
-            <a:r>
-              <a:rPr sz="1800" b="1">
+              <a:t># Combining into a data frame.</a:t>
+            </a:r>
+            <a:br/>
+            <a:br/>
+            <a:r>
+              <a:rPr>
+                <a:latin typeface="Courier"/>
+              </a:rPr>
+              <a:t>patients </a:t>
+            </a:r>
+            <a:r>
+              <a:rPr>
                 <a:solidFill>
                   <a:srgbClr val="007020"/>
                 </a:solidFill>
                 <a:latin typeface="Courier"/>
               </a:rPr>
-              <a:t>c</a:t>
-            </a:r>
-            <a:r>
-              <a:rPr sz="1800">
-                <a:latin typeface="Courier"/>
-              </a:rPr>
-              <a:t>(</a:t>
-            </a:r>
-            <a:r>
-              <a:rPr sz="1800">
+              <a:t>&lt;-</a:t>
+            </a:r>
+            <a:r>
+              <a:rPr>
+                <a:latin typeface="Courier"/>
+              </a:rPr>
+              <a:t> </a:t>
+            </a:r>
+            <a:r>
+              <a:rPr>
                 <a:solidFill>
-                  <a:srgbClr val="40A070"/>
+                  <a:srgbClr val="06287E"/>
                 </a:solidFill>
                 <a:latin typeface="Courier"/>
               </a:rPr>
-              <a:t>50</a:t>
-            </a:r>
-            <a:r>
-              <a:rPr sz="1800">
-                <a:latin typeface="Courier"/>
-              </a:rPr>
-              <a:t>, </a:t>
-            </a:r>
-            <a:r>
-              <a:rPr sz="1800">
-                <a:solidFill>
-                  <a:srgbClr val="40A070"/>
-                </a:solidFill>
-                <a:latin typeface="Courier"/>
-              </a:rPr>
-              <a:t>25</a:t>
-            </a:r>
-            <a:r>
-              <a:rPr sz="1800">
-                <a:latin typeface="Courier"/>
-              </a:rPr>
-              <a:t>, </a:t>
-            </a:r>
-            <a:r>
-              <a:rPr sz="1800">
-                <a:solidFill>
-                  <a:srgbClr val="40A070"/>
-                </a:solidFill>
-                <a:latin typeface="Courier"/>
-              </a:rPr>
-              <a:t>32</a:t>
-            </a:r>
-            <a:r>
-              <a:rPr sz="1800">
-                <a:latin typeface="Courier"/>
-              </a:rPr>
-              <a:t>, </a:t>
-            </a:r>
-            <a:r>
-              <a:rPr sz="1800">
-                <a:solidFill>
-                  <a:srgbClr val="40A070"/>
-                </a:solidFill>
-                <a:latin typeface="Courier"/>
-              </a:rPr>
-              <a:t>67</a:t>
-            </a:r>
-            <a:r>
-              <a:rPr sz="1800">
-                <a:latin typeface="Courier"/>
-              </a:rPr>
-              <a:t>, </a:t>
-            </a:r>
-            <a:r>
-              <a:rPr sz="1800">
-                <a:solidFill>
-                  <a:srgbClr val="40A070"/>
-                </a:solidFill>
-                <a:latin typeface="Courier"/>
-              </a:rPr>
-              <a:t>46</a:t>
-            </a:r>
-            <a:r>
-              <a:rPr sz="1800">
-                <a:latin typeface="Courier"/>
-              </a:rPr>
-              <a:t>, </a:t>
-            </a:r>
-            <a:r>
-              <a:rPr sz="1800">
-                <a:solidFill>
-                  <a:srgbClr val="40A070"/>
-                </a:solidFill>
-                <a:latin typeface="Courier"/>
-              </a:rPr>
-              <a:t>19</a:t>
-            </a:r>
-            <a:r>
-              <a:rPr sz="1800">
-                <a:latin typeface="Courier"/>
-              </a:rPr>
-              <a:t>)</a:t>
-            </a:r>
-            <a:br/>
-            <a:r>
-              <a:rPr sz="1800">
-                <a:latin typeface="Courier"/>
-              </a:rPr>
-              <a:t>gender &lt;-</a:t>
-            </a:r>
-            <a:r>
-              <a:rPr sz="1800">
-                <a:solidFill>
-                  <a:srgbClr val="4070A0"/>
-                </a:solidFill>
-                <a:latin typeface="Courier"/>
-              </a:rPr>
-              <a:t> </a:t>
-            </a:r>
-            <a:r>
-              <a:rPr sz="1800" b="1">
-                <a:solidFill>
-                  <a:srgbClr val="007020"/>
-                </a:solidFill>
-                <a:latin typeface="Courier"/>
-              </a:rPr>
-              <a:t>c</a:t>
-            </a:r>
-            <a:r>
-              <a:rPr sz="1800">
-                <a:latin typeface="Courier"/>
-              </a:rPr>
-              <a:t>(</a:t>
-            </a:r>
-            <a:r>
-              <a:rPr sz="1800">
-                <a:solidFill>
-                  <a:srgbClr val="4070A0"/>
-                </a:solidFill>
-                <a:latin typeface="Courier"/>
-              </a:rPr>
-              <a:t>"male"</a:t>
-            </a:r>
-            <a:r>
-              <a:rPr sz="1800">
-                <a:latin typeface="Courier"/>
-              </a:rPr>
-              <a:t>, </a:t>
-            </a:r>
-            <a:r>
-              <a:rPr sz="1800">
-                <a:solidFill>
-                  <a:srgbClr val="4070A0"/>
-                </a:solidFill>
-                <a:latin typeface="Courier"/>
-              </a:rPr>
-              <a:t>"female"</a:t>
-            </a:r>
-            <a:r>
-              <a:rPr sz="1800">
-                <a:latin typeface="Courier"/>
-              </a:rPr>
-              <a:t>, </a:t>
-            </a:r>
-            <a:r>
-              <a:rPr sz="1800">
-                <a:solidFill>
-                  <a:srgbClr val="4070A0"/>
-                </a:solidFill>
-                <a:latin typeface="Courier"/>
-              </a:rPr>
-              <a:t>"female"</a:t>
-            </a:r>
-            <a:r>
-              <a:rPr sz="1800">
-                <a:latin typeface="Courier"/>
-              </a:rPr>
-              <a:t>, </a:t>
-            </a:r>
-            <a:r>
-              <a:rPr sz="1800">
-                <a:solidFill>
-                  <a:srgbClr val="4070A0"/>
-                </a:solidFill>
-                <a:latin typeface="Courier"/>
-              </a:rPr>
-              <a:t>"male"</a:t>
-            </a:r>
-            <a:r>
-              <a:rPr sz="1800">
-                <a:latin typeface="Courier"/>
-              </a:rPr>
-              <a:t>, </a:t>
-            </a:r>
-            <a:r>
-              <a:rPr sz="1800">
-                <a:solidFill>
-                  <a:srgbClr val="4070A0"/>
-                </a:solidFill>
-                <a:latin typeface="Courier"/>
-              </a:rPr>
-              <a:t>"male"</a:t>
-            </a:r>
-            <a:r>
-              <a:rPr sz="1800">
-                <a:latin typeface="Courier"/>
-              </a:rPr>
-              <a:t>, </a:t>
-            </a:r>
-            <a:r>
-              <a:rPr sz="1800">
-                <a:solidFill>
-                  <a:srgbClr val="4070A0"/>
-                </a:solidFill>
-                <a:latin typeface="Courier"/>
-              </a:rPr>
-              <a:t>"female"</a:t>
-            </a:r>
-            <a:r>
-              <a:rPr sz="1800">
-                <a:latin typeface="Courier"/>
-              </a:rPr>
-              <a:t>)</a:t>
-            </a:r>
-            <a:br/>
-            <a:br/>
-            <a:br/>
-            <a:r>
-              <a:rPr sz="1800" i="1">
-                <a:solidFill>
-                  <a:srgbClr val="60A0B0"/>
-                </a:solidFill>
-                <a:latin typeface="Courier"/>
-              </a:rPr>
-              <a:t># Combining into a data frame.</a:t>
-            </a:r>
-            <a:br/>
-            <a:br/>
-            <a:r>
-              <a:rPr sz="1800">
-                <a:latin typeface="Courier"/>
-              </a:rPr>
-              <a:t>patients &lt;-</a:t>
-            </a:r>
-            <a:r>
-              <a:rPr sz="1800">
-                <a:solidFill>
-                  <a:srgbClr val="4070A0"/>
-                </a:solidFill>
-                <a:latin typeface="Courier"/>
-              </a:rPr>
-              <a:t> </a:t>
-            </a:r>
-            <a:r>
-              <a:rPr sz="1800" b="1">
-                <a:solidFill>
-                  <a:srgbClr val="007020"/>
-                </a:solidFill>
-                <a:latin typeface="Courier"/>
-              </a:rPr>
               <a:t>data.frame</a:t>
             </a:r>
             <a:r>
-              <a:rPr sz="1800">
+              <a:rPr>
                 <a:latin typeface="Courier"/>
               </a:rPr>
               <a:t>(name, age, gender)</a:t>
@@ -13592,22 +13673,22 @@
           <a:bodyPr/>
           <a:lstStyle/>
           <a:p>
-            <a:pPr lvl="0" marL="1270000" indent="0">
+            <a:pPr lvl="0" indent="0">
               <a:buNone/>
             </a:pPr>
             <a:r>
-              <a:rPr sz="1800">
+              <a:rPr>
                 <a:latin typeface="Courier"/>
               </a:rPr>
               <a:t>patients</a:t>
             </a:r>
           </a:p>
           <a:p>
-            <a:pPr lvl="0" marL="1270000" indent="0">
+            <a:pPr lvl="0" indent="0">
               <a:buNone/>
             </a:pPr>
             <a:r>
-              <a:rPr sz="1800">
+              <a:rPr>
                 <a:latin typeface="Courier"/>
               </a:rPr>
               <a:t>##       name age gender
@@ -13773,7 +13854,7 @@
           <a:p>
             <a:pPr lvl="1"/>
             <a:r>
-              <a:rPr sz="1800">
+              <a:rPr>
                 <a:latin typeface="Courier"/>
               </a:rPr>
               <a:t>$</a:t>
@@ -13790,7 +13871,7 @@
               <a:t>We can get the </a:t>
             </a:r>
             <a:r>
-              <a:rPr sz="1800">
+              <a:rPr>
                 <a:latin typeface="Courier"/>
               </a:rPr>
               <a:t>age</a:t>
@@ -13800,7 +13881,7 @@
               <a:t> column from the data frame </a:t>
             </a:r>
             <a:r>
-              <a:rPr sz="1800">
+              <a:rPr>
                 <a:latin typeface="Courier"/>
               </a:rPr>
               <a:t>patients</a:t>
@@ -13811,37 +13892,37 @@
             </a:r>
           </a:p>
           <a:p>
-            <a:pPr lvl="0" marL="1270000" indent="0">
+            <a:pPr lvl="0" indent="0">
               <a:buNone/>
             </a:pPr>
             <a:r>
-              <a:rPr sz="1800">
+              <a:rPr>
                 <a:latin typeface="Courier"/>
               </a:rPr>
               <a:t>patients</a:t>
             </a:r>
             <a:r>
-              <a:rPr sz="1800">
+              <a:rPr>
                 <a:solidFill>
-                  <a:srgbClr val="666666"/>
+                  <a:srgbClr val="4070A0"/>
                 </a:solidFill>
                 <a:latin typeface="Courier"/>
               </a:rPr>
               <a:t>$</a:t>
             </a:r>
             <a:r>
-              <a:rPr sz="1800">
+              <a:rPr>
                 <a:latin typeface="Courier"/>
               </a:rPr>
               <a:t>age</a:t>
             </a:r>
           </a:p>
           <a:p>
-            <a:pPr lvl="0" marL="1270000" indent="0">
+            <a:pPr lvl="0" indent="0">
               <a:buNone/>
             </a:pPr>
             <a:r>
-              <a:rPr sz="1800">
+              <a:rPr>
                 <a:latin typeface="Courier"/>
               </a:rPr>
               <a:t>## [1] 50 25 32 67 46 19</a:t>
@@ -14360,7 +14441,7 @@
           <a:p>
             <a:pPr lvl="2"/>
             <a:r>
-              <a:rPr sz="1800">
+              <a:rPr>
                 <a:latin typeface="Courier"/>
               </a:rPr>
               <a:t>Sys.time()</a:t>
@@ -14369,7 +14450,7 @@
           <a:p>
             <a:pPr lvl="2"/>
             <a:r>
-              <a:rPr sz="1800">
+              <a:rPr>
                 <a:latin typeface="Courier"/>
               </a:rPr>
               <a:t>mean(1:100)</a:t>
@@ -14581,7 +14662,7 @@
           <a:p>
             <a:pPr lvl="1"/>
             <a:r>
-              <a:rPr sz="1800">
+              <a:rPr>
                 <a:latin typeface="Courier"/>
               </a:rPr>
               <a:t>data.frame()</a:t>
@@ -14594,7 +14675,7 @@
           <a:p>
             <a:pPr lvl="1"/>
             <a:r>
-              <a:rPr sz="1800">
+              <a:rPr>
                 <a:latin typeface="Courier"/>
               </a:rPr>
               <a:t>age, gender, weight</a:t>
@@ -14605,31 +14686,31 @@
             </a:r>
           </a:p>
           <a:p>
-            <a:pPr lvl="0" marL="1270000" indent="0">
+            <a:pPr lvl="0" indent="0">
               <a:buNone/>
             </a:pPr>
             <a:r>
-              <a:rPr sz="1800" b="1">
+              <a:rPr>
                 <a:solidFill>
-                  <a:srgbClr val="007020"/>
+                  <a:srgbClr val="06287E"/>
                 </a:solidFill>
                 <a:latin typeface="Courier"/>
               </a:rPr>
               <a:t>data.frame</a:t>
             </a:r>
             <a:r>
-              <a:rPr sz="1800">
+              <a:rPr>
                 <a:latin typeface="Courier"/>
               </a:rPr>
               <a:t>(name, age, gender)</a:t>
             </a:r>
           </a:p>
           <a:p>
-            <a:pPr lvl="0" marL="1270000" indent="0">
+            <a:pPr lvl="0" indent="0">
               <a:buNone/>
             </a:pPr>
             <a:r>
-              <a:rPr sz="1800">
+              <a:rPr>
                 <a:latin typeface="Courier"/>
               </a:rPr>
               <a:t>##       name age gender
@@ -14786,7 +14867,7 @@
               <a:t>Use the </a:t>
             </a:r>
             <a:r>
-              <a:rPr sz="1800">
+              <a:rPr>
                 <a:latin typeface="Courier"/>
               </a:rPr>
               <a:t>patients</a:t>
@@ -14799,7 +14880,7 @@
           <a:p>
             <a:pPr lvl="1"/>
             <a:r>
-              <a:rPr sz="1800">
+              <a:rPr>
                 <a:latin typeface="Courier"/>
               </a:rPr>
               <a:t>head()</a:t>
@@ -14808,7 +14889,7 @@
           <a:p>
             <a:pPr lvl="1"/>
             <a:r>
-              <a:rPr sz="1800">
+              <a:rPr>
                 <a:latin typeface="Courier"/>
               </a:rPr>
               <a:t>tail()</a:t>
@@ -14817,7 +14898,7 @@
           <a:p>
             <a:pPr lvl="1"/>
             <a:r>
-              <a:rPr sz="1800">
+              <a:rPr>
                 <a:latin typeface="Courier"/>
               </a:rPr>
               <a:t>summary()</a:t>
@@ -14925,7 +15006,7 @@
           <a:p>
             <a:pPr lvl="1"/>
             <a:r>
-              <a:rPr sz="1800">
+              <a:rPr>
                 <a:latin typeface="Courier"/>
               </a:rPr>
               <a:t>head()</a:t>
@@ -14938,7 +15019,7 @@
           <a:p>
             <a:pPr lvl="1"/>
             <a:r>
-              <a:rPr sz="1800">
+              <a:rPr>
                 <a:latin typeface="Courier"/>
               </a:rPr>
               <a:t>tail()</a:t>
@@ -14951,7 +15032,7 @@
           <a:p>
             <a:pPr lvl="1"/>
             <a:r>
-              <a:rPr sz="1800">
+              <a:rPr>
                 <a:latin typeface="Courier"/>
               </a:rPr>
               <a:t>summary()</a:t>
@@ -14962,40 +15043,40 @@
             </a:r>
           </a:p>
           <a:p>
-            <a:pPr lvl="0" marL="1270000" indent="0">
+            <a:pPr lvl="0" indent="0">
               <a:buNone/>
             </a:pPr>
             <a:r>
-              <a:rPr sz="1800" b="1">
+              <a:rPr>
                 <a:solidFill>
-                  <a:srgbClr val="007020"/>
+                  <a:srgbClr val="06287E"/>
                 </a:solidFill>
                 <a:latin typeface="Courier"/>
               </a:rPr>
               <a:t>summary</a:t>
             </a:r>
             <a:r>
-              <a:rPr sz="1800">
+              <a:rPr>
                 <a:latin typeface="Courier"/>
               </a:rPr>
               <a:t>(patients)</a:t>
             </a:r>
           </a:p>
           <a:p>
-            <a:pPr lvl="0" marL="1270000" indent="0">
+            <a:pPr lvl="0" indent="0">
               <a:buNone/>
             </a:pPr>
             <a:r>
-              <a:rPr sz="1800">
-                <a:latin typeface="Courier"/>
-              </a:rPr>
-              <a:t>##        name        age           gender 
-##  Adam    :1   Min.   :19.00   female:3  
-##  Eve     :1   1st Qu.:26.75   male  :3  
-##  James   :1   Median :39.00             
-##  Jennifer:1   Mean   :39.83             
-##  John    :1   3rd Qu.:49.00             
-##  Sally   :1   Max.   :67.00</a:t>
+              <a:rPr>
+                <a:latin typeface="Courier"/>
+              </a:rPr>
+              <a:t>##      name                age           gender         
+##  Length:6           Min.   :19.00   Length:6          
+##  Class :character   1st Qu.:26.75   Class :character  
+##  Mode  :character   Median :39.00   Mode  :character  
+##                     Mean   :39.83                     
+##                     3rd Qu.:49.00                     
+##                     Max.   :67.00</a:t>
             </a:r>
           </a:p>
         </p:txBody>
@@ -15102,7 +15183,7 @@
               <a:t>Try </a:t>
             </a:r>
             <a:r>
-              <a:rPr sz="1800">
+              <a:rPr>
                 <a:latin typeface="Courier"/>
               </a:rPr>
               <a:t>mean(patients$gender)</a:t>
@@ -15234,7 +15315,7 @@
               <a:t>Select the </a:t>
             </a:r>
             <a:r>
-              <a:rPr sz="1800">
+              <a:rPr>
                 <a:latin typeface="Courier"/>
               </a:rPr>
               <a:t>help</a:t>
@@ -15251,7 +15332,7 @@
               <a:t>Type </a:t>
             </a:r>
             <a:r>
-              <a:rPr sz="1800">
+              <a:rPr>
                 <a:latin typeface="Courier"/>
               </a:rPr>
               <a:t>?function_name</a:t>
@@ -15268,7 +15349,7 @@
               <a:t>If you can’t remember the exact function name try typing </a:t>
             </a:r>
             <a:r>
-              <a:rPr sz="1800">
+              <a:rPr>
                 <a:latin typeface="Courier"/>
               </a:rPr>
               <a:t>??whatever_you_want_to_do</a:t>
@@ -15803,7 +15884,7 @@
               <a:t>Look up the function </a:t>
             </a:r>
             <a:r>
-              <a:rPr sz="1800">
+              <a:rPr>
                 <a:latin typeface="Courier"/>
               </a:rPr>
               <a:t>ls</a:t>
@@ -15980,26 +16061,26 @@
             </a:r>
           </a:p>
           <a:p>
-            <a:pPr lvl="0" marL="1270000" indent="0">
+            <a:pPr lvl="0" indent="0">
               <a:buNone/>
             </a:pPr>
             <a:r>
-              <a:rPr sz="1800" b="1">
+              <a:rPr>
                 <a:solidFill>
-                  <a:srgbClr val="007020"/>
+                  <a:srgbClr val="06287E"/>
                 </a:solidFill>
                 <a:latin typeface="Courier"/>
               </a:rPr>
               <a:t>install.packages</a:t>
             </a:r>
             <a:r>
-              <a:rPr sz="1800">
+              <a:rPr>
                 <a:latin typeface="Courier"/>
               </a:rPr>
               <a:t>(</a:t>
             </a:r>
             <a:r>
-              <a:rPr sz="1800">
+              <a:rPr>
                 <a:solidFill>
                   <a:srgbClr val="4070A0"/>
                 </a:solidFill>
@@ -16008,23 +16089,23 @@
               <a:t>"tidyverse"</a:t>
             </a:r>
             <a:r>
-              <a:rPr sz="1800">
+              <a:rPr>
                 <a:latin typeface="Courier"/>
               </a:rPr>
               <a:t>)</a:t>
             </a:r>
             <a:br/>
             <a:r>
-              <a:rPr sz="1800" b="1">
+              <a:rPr>
                 <a:solidFill>
-                  <a:srgbClr val="007020"/>
+                  <a:srgbClr val="06287E"/>
                 </a:solidFill>
                 <a:latin typeface="Courier"/>
               </a:rPr>
               <a:t>library</a:t>
             </a:r>
             <a:r>
-              <a:rPr sz="1800">
+              <a:rPr>
                 <a:latin typeface="Courier"/>
               </a:rPr>
               <a:t>(tidyverse)</a:t>
@@ -16044,7 +16125,7 @@
               <a:t>You need to load the package using </a:t>
             </a:r>
             <a:r>
-              <a:rPr sz="1800">
+              <a:rPr>
                 <a:latin typeface="Courier"/>
               </a:rPr>
               <a:t>library</a:t>
@@ -16157,7 +16238,7 @@
           <a:p>
             <a:pPr lvl="1"/>
             <a:r>
-              <a:rPr sz="1800">
+              <a:rPr>
                 <a:latin typeface="Courier"/>
               </a:rPr>
               <a:t>ggplot2</a:t>
@@ -16170,7 +16251,7 @@
           <a:p>
             <a:pPr lvl="1"/>
             <a:r>
-              <a:rPr sz="1800">
+              <a:rPr>
                 <a:latin typeface="Courier"/>
               </a:rPr>
               <a:t>readr</a:t>
@@ -16183,7 +16264,7 @@
           <a:p>
             <a:pPr lvl="1"/>
             <a:r>
-              <a:rPr sz="1800">
+              <a:rPr>
                 <a:latin typeface="Courier"/>
               </a:rPr>
               <a:t>stringr</a:t>
@@ -16196,7 +16277,7 @@
           <a:p>
             <a:pPr lvl="1"/>
             <a:r>
-              <a:rPr sz="1800">
+              <a:rPr>
                 <a:latin typeface="Courier"/>
               </a:rPr>
               <a:t>lubridate</a:t>

</xml_diff>